<commit_message>
align terminology: use ditial twin instead of proxy (Issue 98)
</commit_message>
<xml_diff>
--- a/images/wot-use-cases/wot-use-cases.pptx
+++ b/images/wot-use-cases/wot-use-cases.pptx
@@ -317,7 +317,7 @@
             <a:fld id="{D15E2E9D-520B-4AF5-9F19-1A682015C815}" type="datetimeFigureOut">
               <a:rPr kumimoji="1" lang="ja-JP" altLang="en-US" smtClean="0"/>
               <a:pPr/>
-              <a:t>2019/2/12</a:t>
+              <a:t>2019/3/6</a:t>
             </a:fld>
             <a:endParaRPr kumimoji="1" lang="ja-JP" altLang="en-US"/>
           </a:p>
@@ -489,7 +489,7 @@
             <a:fld id="{D15E2E9D-520B-4AF5-9F19-1A682015C815}" type="datetimeFigureOut">
               <a:rPr kumimoji="1" lang="ja-JP" altLang="en-US" smtClean="0"/>
               <a:pPr/>
-              <a:t>2019/2/12</a:t>
+              <a:t>2019/3/6</a:t>
             </a:fld>
             <a:endParaRPr kumimoji="1" lang="ja-JP" altLang="en-US"/>
           </a:p>
@@ -671,7 +671,7 @@
             <a:fld id="{D15E2E9D-520B-4AF5-9F19-1A682015C815}" type="datetimeFigureOut">
               <a:rPr kumimoji="1" lang="ja-JP" altLang="en-US" smtClean="0"/>
               <a:pPr/>
-              <a:t>2019/2/12</a:t>
+              <a:t>2019/3/6</a:t>
             </a:fld>
             <a:endParaRPr kumimoji="1" lang="ja-JP" altLang="en-US"/>
           </a:p>
@@ -843,7 +843,7 @@
             <a:fld id="{D15E2E9D-520B-4AF5-9F19-1A682015C815}" type="datetimeFigureOut">
               <a:rPr kumimoji="1" lang="ja-JP" altLang="en-US" smtClean="0"/>
               <a:pPr/>
-              <a:t>2019/2/12</a:t>
+              <a:t>2019/3/6</a:t>
             </a:fld>
             <a:endParaRPr kumimoji="1" lang="ja-JP" altLang="en-US"/>
           </a:p>
@@ -1091,7 +1091,7 @@
             <a:fld id="{D15E2E9D-520B-4AF5-9F19-1A682015C815}" type="datetimeFigureOut">
               <a:rPr kumimoji="1" lang="ja-JP" altLang="en-US" smtClean="0"/>
               <a:pPr/>
-              <a:t>2019/2/12</a:t>
+              <a:t>2019/3/6</a:t>
             </a:fld>
             <a:endParaRPr kumimoji="1" lang="ja-JP" altLang="en-US"/>
           </a:p>
@@ -1381,7 +1381,7 @@
             <a:fld id="{D15E2E9D-520B-4AF5-9F19-1A682015C815}" type="datetimeFigureOut">
               <a:rPr kumimoji="1" lang="ja-JP" altLang="en-US" smtClean="0"/>
               <a:pPr/>
-              <a:t>2019/2/12</a:t>
+              <a:t>2019/3/6</a:t>
             </a:fld>
             <a:endParaRPr kumimoji="1" lang="ja-JP" altLang="en-US"/>
           </a:p>
@@ -1805,7 +1805,7 @@
             <a:fld id="{D15E2E9D-520B-4AF5-9F19-1A682015C815}" type="datetimeFigureOut">
               <a:rPr kumimoji="1" lang="ja-JP" altLang="en-US" smtClean="0"/>
               <a:pPr/>
-              <a:t>2019/2/12</a:t>
+              <a:t>2019/3/6</a:t>
             </a:fld>
             <a:endParaRPr kumimoji="1" lang="ja-JP" altLang="en-US"/>
           </a:p>
@@ -1925,7 +1925,7 @@
             <a:fld id="{D15E2E9D-520B-4AF5-9F19-1A682015C815}" type="datetimeFigureOut">
               <a:rPr kumimoji="1" lang="ja-JP" altLang="en-US" smtClean="0"/>
               <a:pPr/>
-              <a:t>2019/2/12</a:t>
+              <a:t>2019/3/6</a:t>
             </a:fld>
             <a:endParaRPr kumimoji="1" lang="ja-JP" altLang="en-US"/>
           </a:p>
@@ -2022,7 +2022,7 @@
             <a:fld id="{D15E2E9D-520B-4AF5-9F19-1A682015C815}" type="datetimeFigureOut">
               <a:rPr kumimoji="1" lang="ja-JP" altLang="en-US" smtClean="0"/>
               <a:pPr/>
-              <a:t>2019/2/12</a:t>
+              <a:t>2019/3/6</a:t>
             </a:fld>
             <a:endParaRPr kumimoji="1" lang="ja-JP" altLang="en-US"/>
           </a:p>
@@ -2301,7 +2301,7 @@
             <a:fld id="{D15E2E9D-520B-4AF5-9F19-1A682015C815}" type="datetimeFigureOut">
               <a:rPr kumimoji="1" lang="ja-JP" altLang="en-US" smtClean="0"/>
               <a:pPr/>
-              <a:t>2019/2/12</a:t>
+              <a:t>2019/3/6</a:t>
             </a:fld>
             <a:endParaRPr kumimoji="1" lang="ja-JP" altLang="en-US"/>
           </a:p>
@@ -2556,7 +2556,7 @@
             <a:fld id="{D15E2E9D-520B-4AF5-9F19-1A682015C815}" type="datetimeFigureOut">
               <a:rPr kumimoji="1" lang="ja-JP" altLang="en-US" smtClean="0"/>
               <a:pPr/>
-              <a:t>2019/2/12</a:t>
+              <a:t>2019/3/6</a:t>
             </a:fld>
             <a:endParaRPr kumimoji="1" lang="ja-JP" altLang="en-US"/>
           </a:p>
@@ -2771,7 +2771,7 @@
             <a:fld id="{D15E2E9D-520B-4AF5-9F19-1A682015C815}" type="datetimeFigureOut">
               <a:rPr kumimoji="1" lang="ja-JP" altLang="en-US" smtClean="0"/>
               <a:pPr/>
-              <a:t>2019/2/12</a:t>
+              <a:t>2019/3/6</a:t>
             </a:fld>
             <a:endParaRPr kumimoji="1" lang="ja-JP" altLang="en-US"/>
           </a:p>
@@ -11863,8 +11863,8 @@
         </p:nvSpPr>
         <p:spPr>
           <a:xfrm>
-            <a:off x="5484866" y="1340768"/>
-            <a:ext cx="700641" cy="369332"/>
+            <a:off x="5076056" y="1340768"/>
+            <a:ext cx="1608069" cy="369332"/>
           </a:xfrm>
           <a:prstGeom prst="rect">
             <a:avLst/>
@@ -11879,7 +11879,7 @@
           <a:p>
             <a:r>
               <a:rPr lang="en-US" altLang="ja-JP" dirty="0"/>
-              <a:t>Proxy</a:t>
+              <a:t>Appliance Twin</a:t>
             </a:r>
             <a:endParaRPr kumimoji="1" lang="ja-JP" altLang="en-US" dirty="0"/>
           </a:p>

</xml_diff>

<commit_message>
Added Smart Home as Consumer use case
</commit_message>
<xml_diff>
--- a/images/wot-use-cases/wot-use-cases.pptx
+++ b/images/wot-use-cases/wot-use-cases.pptx
@@ -16,8 +16,9 @@
     <p:sldId id="273" r:id="rId10"/>
     <p:sldId id="274" r:id="rId11"/>
     <p:sldId id="275" r:id="rId12"/>
-    <p:sldId id="262" r:id="rId13"/>
-    <p:sldId id="263" r:id="rId14"/>
+    <p:sldId id="276" r:id="rId13"/>
+    <p:sldId id="262" r:id="rId14"/>
+    <p:sldId id="263" r:id="rId15"/>
   </p:sldIdLst>
   <p:sldSz cx="9144000" cy="6858000" type="screen4x3"/>
   <p:notesSz cx="6858000" cy="9144000"/>
@@ -317,7 +318,7 @@
             <a:fld id="{D15E2E9D-520B-4AF5-9F19-1A682015C815}" type="datetimeFigureOut">
               <a:rPr kumimoji="1" lang="ja-JP" altLang="en-US" smtClean="0"/>
               <a:pPr/>
-              <a:t>2019/3/6</a:t>
+              <a:t>2019/3/10</a:t>
             </a:fld>
             <a:endParaRPr kumimoji="1" lang="ja-JP" altLang="en-US"/>
           </a:p>
@@ -489,7 +490,7 @@
             <a:fld id="{D15E2E9D-520B-4AF5-9F19-1A682015C815}" type="datetimeFigureOut">
               <a:rPr kumimoji="1" lang="ja-JP" altLang="en-US" smtClean="0"/>
               <a:pPr/>
-              <a:t>2019/3/6</a:t>
+              <a:t>2019/3/10</a:t>
             </a:fld>
             <a:endParaRPr kumimoji="1" lang="ja-JP" altLang="en-US"/>
           </a:p>
@@ -671,7 +672,7 @@
             <a:fld id="{D15E2E9D-520B-4AF5-9F19-1A682015C815}" type="datetimeFigureOut">
               <a:rPr kumimoji="1" lang="ja-JP" altLang="en-US" smtClean="0"/>
               <a:pPr/>
-              <a:t>2019/3/6</a:t>
+              <a:t>2019/3/10</a:t>
             </a:fld>
             <a:endParaRPr kumimoji="1" lang="ja-JP" altLang="en-US"/>
           </a:p>
@@ -843,7 +844,7 @@
             <a:fld id="{D15E2E9D-520B-4AF5-9F19-1A682015C815}" type="datetimeFigureOut">
               <a:rPr kumimoji="1" lang="ja-JP" altLang="en-US" smtClean="0"/>
               <a:pPr/>
-              <a:t>2019/3/6</a:t>
+              <a:t>2019/3/10</a:t>
             </a:fld>
             <a:endParaRPr kumimoji="1" lang="ja-JP" altLang="en-US"/>
           </a:p>
@@ -1091,7 +1092,7 @@
             <a:fld id="{D15E2E9D-520B-4AF5-9F19-1A682015C815}" type="datetimeFigureOut">
               <a:rPr kumimoji="1" lang="ja-JP" altLang="en-US" smtClean="0"/>
               <a:pPr/>
-              <a:t>2019/3/6</a:t>
+              <a:t>2019/3/10</a:t>
             </a:fld>
             <a:endParaRPr kumimoji="1" lang="ja-JP" altLang="en-US"/>
           </a:p>
@@ -1381,7 +1382,7 @@
             <a:fld id="{D15E2E9D-520B-4AF5-9F19-1A682015C815}" type="datetimeFigureOut">
               <a:rPr kumimoji="1" lang="ja-JP" altLang="en-US" smtClean="0"/>
               <a:pPr/>
-              <a:t>2019/3/6</a:t>
+              <a:t>2019/3/10</a:t>
             </a:fld>
             <a:endParaRPr kumimoji="1" lang="ja-JP" altLang="en-US"/>
           </a:p>
@@ -1805,7 +1806,7 @@
             <a:fld id="{D15E2E9D-520B-4AF5-9F19-1A682015C815}" type="datetimeFigureOut">
               <a:rPr kumimoji="1" lang="ja-JP" altLang="en-US" smtClean="0"/>
               <a:pPr/>
-              <a:t>2019/3/6</a:t>
+              <a:t>2019/3/10</a:t>
             </a:fld>
             <a:endParaRPr kumimoji="1" lang="ja-JP" altLang="en-US"/>
           </a:p>
@@ -1925,7 +1926,7 @@
             <a:fld id="{D15E2E9D-520B-4AF5-9F19-1A682015C815}" type="datetimeFigureOut">
               <a:rPr kumimoji="1" lang="ja-JP" altLang="en-US" smtClean="0"/>
               <a:pPr/>
-              <a:t>2019/3/6</a:t>
+              <a:t>2019/3/10</a:t>
             </a:fld>
             <a:endParaRPr kumimoji="1" lang="ja-JP" altLang="en-US"/>
           </a:p>
@@ -2022,7 +2023,7 @@
             <a:fld id="{D15E2E9D-520B-4AF5-9F19-1A682015C815}" type="datetimeFigureOut">
               <a:rPr kumimoji="1" lang="ja-JP" altLang="en-US" smtClean="0"/>
               <a:pPr/>
-              <a:t>2019/3/6</a:t>
+              <a:t>2019/3/10</a:t>
             </a:fld>
             <a:endParaRPr kumimoji="1" lang="ja-JP" altLang="en-US"/>
           </a:p>
@@ -2301,7 +2302,7 @@
             <a:fld id="{D15E2E9D-520B-4AF5-9F19-1A682015C815}" type="datetimeFigureOut">
               <a:rPr kumimoji="1" lang="ja-JP" altLang="en-US" smtClean="0"/>
               <a:pPr/>
-              <a:t>2019/3/6</a:t>
+              <a:t>2019/3/10</a:t>
             </a:fld>
             <a:endParaRPr kumimoji="1" lang="ja-JP" altLang="en-US"/>
           </a:p>
@@ -2556,7 +2557,7 @@
             <a:fld id="{D15E2E9D-520B-4AF5-9F19-1A682015C815}" type="datetimeFigureOut">
               <a:rPr kumimoji="1" lang="ja-JP" altLang="en-US" smtClean="0"/>
               <a:pPr/>
-              <a:t>2019/3/6</a:t>
+              <a:t>2019/3/10</a:t>
             </a:fld>
             <a:endParaRPr kumimoji="1" lang="ja-JP" altLang="en-US"/>
           </a:p>
@@ -2771,7 +2772,7 @@
             <a:fld id="{D15E2E9D-520B-4AF5-9F19-1A682015C815}" type="datetimeFigureOut">
               <a:rPr kumimoji="1" lang="ja-JP" altLang="en-US" smtClean="0"/>
               <a:pPr/>
-              <a:t>2019/3/6</a:t>
+              <a:t>2019/3/10</a:t>
             </a:fld>
             <a:endParaRPr kumimoji="1" lang="ja-JP" altLang="en-US"/>
           </a:p>
@@ -3378,7 +3379,7 @@
           <p:cNvPr id="10" name="テキスト ボックス 18">
             <a:extLst>
               <a:ext uri="{FF2B5EF4-FFF2-40B4-BE49-F238E27FC236}">
-                <a16:creationId xmlns:a16="http://schemas.microsoft.com/office/drawing/2014/main" id="{8FF2E807-8B8E-C743-A198-DE8D9FE0B353}"/>
+                <a16:creationId xmlns="" xmlns:a16="http://schemas.microsoft.com/office/drawing/2014/main" id="{8FF2E807-8B8E-C743-A198-DE8D9FE0B353}"/>
               </a:ext>
             </a:extLst>
           </p:cNvPr>
@@ -3899,7 +3900,7 @@
           <p:cNvPr id="20" name="テキスト ボックス 18">
             <a:extLst>
               <a:ext uri="{FF2B5EF4-FFF2-40B4-BE49-F238E27FC236}">
-                <a16:creationId xmlns:a16="http://schemas.microsoft.com/office/drawing/2014/main" id="{1BABC55C-975E-6846-985C-88584B52D21F}"/>
+                <a16:creationId xmlns="" xmlns:a16="http://schemas.microsoft.com/office/drawing/2014/main" id="{1BABC55C-975E-6846-985C-88584B52D21F}"/>
               </a:ext>
             </a:extLst>
           </p:cNvPr>
@@ -3936,7 +3937,7 @@
           <p:cNvPr id="3" name="Oval 2">
             <a:extLst>
               <a:ext uri="{FF2B5EF4-FFF2-40B4-BE49-F238E27FC236}">
-                <a16:creationId xmlns:a16="http://schemas.microsoft.com/office/drawing/2014/main" id="{F23D0E80-999F-1541-A5F6-6BBF0C95A4C5}"/>
+                <a16:creationId xmlns="" xmlns:a16="http://schemas.microsoft.com/office/drawing/2014/main" id="{F23D0E80-999F-1541-A5F6-6BBF0C95A4C5}"/>
               </a:ext>
             </a:extLst>
           </p:cNvPr>
@@ -3982,7 +3983,7 @@
           <p:cNvPr id="25" name="Oval 24">
             <a:extLst>
               <a:ext uri="{FF2B5EF4-FFF2-40B4-BE49-F238E27FC236}">
-                <a16:creationId xmlns:a16="http://schemas.microsoft.com/office/drawing/2014/main" id="{3D400183-EBD7-8543-BD63-433B580A26EB}"/>
+                <a16:creationId xmlns="" xmlns:a16="http://schemas.microsoft.com/office/drawing/2014/main" id="{3D400183-EBD7-8543-BD63-433B580A26EB}"/>
               </a:ext>
             </a:extLst>
           </p:cNvPr>
@@ -4028,7 +4029,7 @@
           <p:cNvPr id="28" name="Oval 27">
             <a:extLst>
               <a:ext uri="{FF2B5EF4-FFF2-40B4-BE49-F238E27FC236}">
-                <a16:creationId xmlns:a16="http://schemas.microsoft.com/office/drawing/2014/main" id="{D2E8EC0D-77EA-EF45-888C-45592064E80E}"/>
+                <a16:creationId xmlns="" xmlns:a16="http://schemas.microsoft.com/office/drawing/2014/main" id="{D2E8EC0D-77EA-EF45-888C-45592064E80E}"/>
               </a:ext>
             </a:extLst>
           </p:cNvPr>
@@ -4074,7 +4075,7 @@
           <p:cNvPr id="29" name="Oval 28">
             <a:extLst>
               <a:ext uri="{FF2B5EF4-FFF2-40B4-BE49-F238E27FC236}">
-                <a16:creationId xmlns:a16="http://schemas.microsoft.com/office/drawing/2014/main" id="{FAAC52EC-CA61-844C-BFEC-FD01C27DCB59}"/>
+                <a16:creationId xmlns="" xmlns:a16="http://schemas.microsoft.com/office/drawing/2014/main" id="{FAAC52EC-CA61-844C-BFEC-FD01C27DCB59}"/>
               </a:ext>
             </a:extLst>
           </p:cNvPr>
@@ -4120,7 +4121,7 @@
           <p:cNvPr id="30" name="Oval 29">
             <a:extLst>
               <a:ext uri="{FF2B5EF4-FFF2-40B4-BE49-F238E27FC236}">
-                <a16:creationId xmlns:a16="http://schemas.microsoft.com/office/drawing/2014/main" id="{E1B6F3D0-C69A-5A4C-BA4C-AC839758A2C7}"/>
+                <a16:creationId xmlns="" xmlns:a16="http://schemas.microsoft.com/office/drawing/2014/main" id="{E1B6F3D0-C69A-5A4C-BA4C-AC839758A2C7}"/>
               </a:ext>
             </a:extLst>
           </p:cNvPr>
@@ -4166,7 +4167,7 @@
           <p:cNvPr id="5" name="Straight Connector 4">
             <a:extLst>
               <a:ext uri="{FF2B5EF4-FFF2-40B4-BE49-F238E27FC236}">
-                <a16:creationId xmlns:a16="http://schemas.microsoft.com/office/drawing/2014/main" id="{BE538986-3A1C-E34A-9C72-DC4DEEB9D1FC}"/>
+                <a16:creationId xmlns="" xmlns:a16="http://schemas.microsoft.com/office/drawing/2014/main" id="{BE538986-3A1C-E34A-9C72-DC4DEEB9D1FC}"/>
               </a:ext>
             </a:extLst>
           </p:cNvPr>
@@ -4206,7 +4207,7 @@
           <p:cNvPr id="9" name="Straight Connector 8">
             <a:extLst>
               <a:ext uri="{FF2B5EF4-FFF2-40B4-BE49-F238E27FC236}">
-                <a16:creationId xmlns:a16="http://schemas.microsoft.com/office/drawing/2014/main" id="{BD5BF377-A61B-6F40-BC3D-41BA7E5C3680}"/>
+                <a16:creationId xmlns="" xmlns:a16="http://schemas.microsoft.com/office/drawing/2014/main" id="{BD5BF377-A61B-6F40-BC3D-41BA7E5C3680}"/>
               </a:ext>
             </a:extLst>
           </p:cNvPr>
@@ -4245,7 +4246,7 @@
           <p:cNvPr id="12" name="Straight Connector 11">
             <a:extLst>
               <a:ext uri="{FF2B5EF4-FFF2-40B4-BE49-F238E27FC236}">
-                <a16:creationId xmlns:a16="http://schemas.microsoft.com/office/drawing/2014/main" id="{931CAE2B-3739-E749-AFC3-8FF0F5318057}"/>
+                <a16:creationId xmlns="" xmlns:a16="http://schemas.microsoft.com/office/drawing/2014/main" id="{931CAE2B-3739-E749-AFC3-8FF0F5318057}"/>
               </a:ext>
             </a:extLst>
           </p:cNvPr>
@@ -4285,7 +4286,7 @@
           <p:cNvPr id="33" name="Straight Connector 32">
             <a:extLst>
               <a:ext uri="{FF2B5EF4-FFF2-40B4-BE49-F238E27FC236}">
-                <a16:creationId xmlns:a16="http://schemas.microsoft.com/office/drawing/2014/main" id="{575FB9A1-2A60-0440-87E9-9EF358ED596C}"/>
+                <a16:creationId xmlns="" xmlns:a16="http://schemas.microsoft.com/office/drawing/2014/main" id="{575FB9A1-2A60-0440-87E9-9EF358ED596C}"/>
               </a:ext>
             </a:extLst>
           </p:cNvPr>
@@ -4324,7 +4325,7 @@
           <p:cNvPr id="35" name="Straight Connector 34">
             <a:extLst>
               <a:ext uri="{FF2B5EF4-FFF2-40B4-BE49-F238E27FC236}">
-                <a16:creationId xmlns:a16="http://schemas.microsoft.com/office/drawing/2014/main" id="{88A1850E-CD69-1649-A05E-8AFBAA505FD7}"/>
+                <a16:creationId xmlns="" xmlns:a16="http://schemas.microsoft.com/office/drawing/2014/main" id="{88A1850E-CD69-1649-A05E-8AFBAA505FD7}"/>
               </a:ext>
             </a:extLst>
           </p:cNvPr>
@@ -4363,7 +4364,7 @@
           <p:cNvPr id="40" name="Straight Connector 39">
             <a:extLst>
               <a:ext uri="{FF2B5EF4-FFF2-40B4-BE49-F238E27FC236}">
-                <a16:creationId xmlns:a16="http://schemas.microsoft.com/office/drawing/2014/main" id="{85936ABA-53DB-7541-A3A9-B326378109BB}"/>
+                <a16:creationId xmlns="" xmlns:a16="http://schemas.microsoft.com/office/drawing/2014/main" id="{85936ABA-53DB-7541-A3A9-B326378109BB}"/>
               </a:ext>
             </a:extLst>
           </p:cNvPr>
@@ -4402,7 +4403,7 @@
           <p:cNvPr id="42" name="直線矢印コネクタ 17">
             <a:extLst>
               <a:ext uri="{FF2B5EF4-FFF2-40B4-BE49-F238E27FC236}">
-                <a16:creationId xmlns:a16="http://schemas.microsoft.com/office/drawing/2014/main" id="{B5342E1A-177F-CD4A-95C3-440FC11D1ADA}"/>
+                <a16:creationId xmlns="" xmlns:a16="http://schemas.microsoft.com/office/drawing/2014/main" id="{B5342E1A-177F-CD4A-95C3-440FC11D1ADA}"/>
               </a:ext>
             </a:extLst>
           </p:cNvPr>
@@ -4443,7 +4444,7 @@
           <p:cNvPr id="56" name="Group 55">
             <a:extLst>
               <a:ext uri="{FF2B5EF4-FFF2-40B4-BE49-F238E27FC236}">
-                <a16:creationId xmlns:a16="http://schemas.microsoft.com/office/drawing/2014/main" id="{2D959D33-4592-6241-AF4E-D65E8625FEFB}"/>
+                <a16:creationId xmlns="" xmlns:a16="http://schemas.microsoft.com/office/drawing/2014/main" id="{2D959D33-4592-6241-AF4E-D65E8625FEFB}"/>
               </a:ext>
             </a:extLst>
           </p:cNvPr>
@@ -4463,7 +4464,7 @@
             <p:cNvPr id="45" name="Oval 44">
               <a:extLst>
                 <a:ext uri="{FF2B5EF4-FFF2-40B4-BE49-F238E27FC236}">
-                  <a16:creationId xmlns:a16="http://schemas.microsoft.com/office/drawing/2014/main" id="{935AC238-E6E2-2643-9B0F-E136836BE7D4}"/>
+                  <a16:creationId xmlns="" xmlns:a16="http://schemas.microsoft.com/office/drawing/2014/main" id="{935AC238-E6E2-2643-9B0F-E136836BE7D4}"/>
                 </a:ext>
               </a:extLst>
             </p:cNvPr>
@@ -4509,7 +4510,7 @@
             <p:cNvPr id="46" name="Oval 45">
               <a:extLst>
                 <a:ext uri="{FF2B5EF4-FFF2-40B4-BE49-F238E27FC236}">
-                  <a16:creationId xmlns:a16="http://schemas.microsoft.com/office/drawing/2014/main" id="{E422B34F-EF76-BD48-BD1A-5CC0D46B90F7}"/>
+                  <a16:creationId xmlns="" xmlns:a16="http://schemas.microsoft.com/office/drawing/2014/main" id="{E422B34F-EF76-BD48-BD1A-5CC0D46B90F7}"/>
                 </a:ext>
               </a:extLst>
             </p:cNvPr>
@@ -4555,7 +4556,7 @@
             <p:cNvPr id="47" name="Oval 46">
               <a:extLst>
                 <a:ext uri="{FF2B5EF4-FFF2-40B4-BE49-F238E27FC236}">
-                  <a16:creationId xmlns:a16="http://schemas.microsoft.com/office/drawing/2014/main" id="{8DDF368E-408E-114E-8B8B-24CF9BAD529C}"/>
+                  <a16:creationId xmlns="" xmlns:a16="http://schemas.microsoft.com/office/drawing/2014/main" id="{8DDF368E-408E-114E-8B8B-24CF9BAD529C}"/>
                 </a:ext>
               </a:extLst>
             </p:cNvPr>
@@ -4601,7 +4602,7 @@
             <p:cNvPr id="48" name="Oval 47">
               <a:extLst>
                 <a:ext uri="{FF2B5EF4-FFF2-40B4-BE49-F238E27FC236}">
-                  <a16:creationId xmlns:a16="http://schemas.microsoft.com/office/drawing/2014/main" id="{4BD5F66E-B454-3240-8BC2-45992CC7E4CD}"/>
+                  <a16:creationId xmlns="" xmlns:a16="http://schemas.microsoft.com/office/drawing/2014/main" id="{4BD5F66E-B454-3240-8BC2-45992CC7E4CD}"/>
                 </a:ext>
               </a:extLst>
             </p:cNvPr>
@@ -4647,7 +4648,7 @@
             <p:cNvPr id="49" name="Oval 48">
               <a:extLst>
                 <a:ext uri="{FF2B5EF4-FFF2-40B4-BE49-F238E27FC236}">
-                  <a16:creationId xmlns:a16="http://schemas.microsoft.com/office/drawing/2014/main" id="{894C2FD1-5E7E-7847-A94A-473DA7C8B636}"/>
+                  <a16:creationId xmlns="" xmlns:a16="http://schemas.microsoft.com/office/drawing/2014/main" id="{894C2FD1-5E7E-7847-A94A-473DA7C8B636}"/>
                 </a:ext>
               </a:extLst>
             </p:cNvPr>
@@ -4693,7 +4694,7 @@
             <p:cNvPr id="50" name="Straight Connector 49">
               <a:extLst>
                 <a:ext uri="{FF2B5EF4-FFF2-40B4-BE49-F238E27FC236}">
-                  <a16:creationId xmlns:a16="http://schemas.microsoft.com/office/drawing/2014/main" id="{664F36E1-C5F6-B746-B49A-884B06626ECE}"/>
+                  <a16:creationId xmlns="" xmlns:a16="http://schemas.microsoft.com/office/drawing/2014/main" id="{664F36E1-C5F6-B746-B49A-884B06626ECE}"/>
                 </a:ext>
               </a:extLst>
             </p:cNvPr>
@@ -4733,7 +4734,7 @@
             <p:cNvPr id="51" name="Straight Connector 50">
               <a:extLst>
                 <a:ext uri="{FF2B5EF4-FFF2-40B4-BE49-F238E27FC236}">
-                  <a16:creationId xmlns:a16="http://schemas.microsoft.com/office/drawing/2014/main" id="{62CCD05C-9AFC-9B41-A681-897093A7548D}"/>
+                  <a16:creationId xmlns="" xmlns:a16="http://schemas.microsoft.com/office/drawing/2014/main" id="{62CCD05C-9AFC-9B41-A681-897093A7548D}"/>
                 </a:ext>
               </a:extLst>
             </p:cNvPr>
@@ -4772,7 +4773,7 @@
             <p:cNvPr id="52" name="Straight Connector 51">
               <a:extLst>
                 <a:ext uri="{FF2B5EF4-FFF2-40B4-BE49-F238E27FC236}">
-                  <a16:creationId xmlns:a16="http://schemas.microsoft.com/office/drawing/2014/main" id="{975D1C85-0E92-6B4B-90A8-D9F713B3D17F}"/>
+                  <a16:creationId xmlns="" xmlns:a16="http://schemas.microsoft.com/office/drawing/2014/main" id="{975D1C85-0E92-6B4B-90A8-D9F713B3D17F}"/>
                 </a:ext>
               </a:extLst>
             </p:cNvPr>
@@ -4812,7 +4813,7 @@
             <p:cNvPr id="53" name="Straight Connector 52">
               <a:extLst>
                 <a:ext uri="{FF2B5EF4-FFF2-40B4-BE49-F238E27FC236}">
-                  <a16:creationId xmlns:a16="http://schemas.microsoft.com/office/drawing/2014/main" id="{65740447-AD2D-104C-AFE7-F429DAD14FB8}"/>
+                  <a16:creationId xmlns="" xmlns:a16="http://schemas.microsoft.com/office/drawing/2014/main" id="{65740447-AD2D-104C-AFE7-F429DAD14FB8}"/>
                 </a:ext>
               </a:extLst>
             </p:cNvPr>
@@ -4851,7 +4852,7 @@
             <p:cNvPr id="54" name="Straight Connector 53">
               <a:extLst>
                 <a:ext uri="{FF2B5EF4-FFF2-40B4-BE49-F238E27FC236}">
-                  <a16:creationId xmlns:a16="http://schemas.microsoft.com/office/drawing/2014/main" id="{CC599206-FC07-594F-8EE7-A6CA2B45F234}"/>
+                  <a16:creationId xmlns="" xmlns:a16="http://schemas.microsoft.com/office/drawing/2014/main" id="{CC599206-FC07-594F-8EE7-A6CA2B45F234}"/>
                 </a:ext>
               </a:extLst>
             </p:cNvPr>
@@ -4890,7 +4891,7 @@
             <p:cNvPr id="55" name="Straight Connector 54">
               <a:extLst>
                 <a:ext uri="{FF2B5EF4-FFF2-40B4-BE49-F238E27FC236}">
-                  <a16:creationId xmlns:a16="http://schemas.microsoft.com/office/drawing/2014/main" id="{F76E8DF1-3DC4-5640-A9C5-5C3D12B750E0}"/>
+                  <a16:creationId xmlns="" xmlns:a16="http://schemas.microsoft.com/office/drawing/2014/main" id="{F76E8DF1-3DC4-5640-A9C5-5C3D12B750E0}"/>
                 </a:ext>
               </a:extLst>
             </p:cNvPr>
@@ -5134,7 +5135,7 @@
           <p:cNvPr id="2" name="Group 1">
             <a:extLst>
               <a:ext uri="{FF2B5EF4-FFF2-40B4-BE49-F238E27FC236}">
-                <a16:creationId xmlns:a16="http://schemas.microsoft.com/office/drawing/2014/main" id="{A724D2BE-BF5E-D94F-8450-1751B4AE53D7}"/>
+                <a16:creationId xmlns="" xmlns:a16="http://schemas.microsoft.com/office/drawing/2014/main" id="{A724D2BE-BF5E-D94F-8450-1751B4AE53D7}"/>
               </a:ext>
             </a:extLst>
           </p:cNvPr>
@@ -5185,7 +5186,7 @@
             <p:cNvPr id="29" name="Oval 28">
               <a:extLst>
                 <a:ext uri="{FF2B5EF4-FFF2-40B4-BE49-F238E27FC236}">
-                  <a16:creationId xmlns:a16="http://schemas.microsoft.com/office/drawing/2014/main" id="{FAAC52EC-CA61-844C-BFEC-FD01C27DCB59}"/>
+                  <a16:creationId xmlns="" xmlns:a16="http://schemas.microsoft.com/office/drawing/2014/main" id="{FAAC52EC-CA61-844C-BFEC-FD01C27DCB59}"/>
                 </a:ext>
               </a:extLst>
             </p:cNvPr>
@@ -5280,7 +5281,7 @@
           <p:cNvPr id="57" name="正方形/長方形 17">
             <a:extLst>
               <a:ext uri="{FF2B5EF4-FFF2-40B4-BE49-F238E27FC236}">
-                <a16:creationId xmlns:a16="http://schemas.microsoft.com/office/drawing/2014/main" id="{130B3935-1247-3348-8096-94B45ADA2C4F}"/>
+                <a16:creationId xmlns="" xmlns:a16="http://schemas.microsoft.com/office/drawing/2014/main" id="{130B3935-1247-3348-8096-94B45ADA2C4F}"/>
               </a:ext>
             </a:extLst>
           </p:cNvPr>
@@ -5388,7 +5389,7 @@
           <p:cNvPr id="58" name="Group 57">
             <a:extLst>
               <a:ext uri="{FF2B5EF4-FFF2-40B4-BE49-F238E27FC236}">
-                <a16:creationId xmlns:a16="http://schemas.microsoft.com/office/drawing/2014/main" id="{1122A44C-DC11-CA43-AAB9-934279EF613C}"/>
+                <a16:creationId xmlns="" xmlns:a16="http://schemas.microsoft.com/office/drawing/2014/main" id="{1122A44C-DC11-CA43-AAB9-934279EF613C}"/>
               </a:ext>
             </a:extLst>
           </p:cNvPr>
@@ -5408,7 +5409,7 @@
             <p:cNvPr id="59" name="Oval 58">
               <a:extLst>
                 <a:ext uri="{FF2B5EF4-FFF2-40B4-BE49-F238E27FC236}">
-                  <a16:creationId xmlns:a16="http://schemas.microsoft.com/office/drawing/2014/main" id="{1AC815EF-350D-6F45-BCCD-E2241D4A81AE}"/>
+                  <a16:creationId xmlns="" xmlns:a16="http://schemas.microsoft.com/office/drawing/2014/main" id="{1AC815EF-350D-6F45-BCCD-E2241D4A81AE}"/>
                 </a:ext>
               </a:extLst>
             </p:cNvPr>
@@ -5454,7 +5455,7 @@
             <p:cNvPr id="60" name="Oval 59">
               <a:extLst>
                 <a:ext uri="{FF2B5EF4-FFF2-40B4-BE49-F238E27FC236}">
-                  <a16:creationId xmlns:a16="http://schemas.microsoft.com/office/drawing/2014/main" id="{688CB2FF-E17D-6B45-A615-DD1CE4CF8524}"/>
+                  <a16:creationId xmlns="" xmlns:a16="http://schemas.microsoft.com/office/drawing/2014/main" id="{688CB2FF-E17D-6B45-A615-DD1CE4CF8524}"/>
                 </a:ext>
               </a:extLst>
             </p:cNvPr>
@@ -5500,7 +5501,7 @@
             <p:cNvPr id="61" name="Oval 60">
               <a:extLst>
                 <a:ext uri="{FF2B5EF4-FFF2-40B4-BE49-F238E27FC236}">
-                  <a16:creationId xmlns:a16="http://schemas.microsoft.com/office/drawing/2014/main" id="{26E520C9-124A-AB42-AC17-4C557C0B1892}"/>
+                  <a16:creationId xmlns="" xmlns:a16="http://schemas.microsoft.com/office/drawing/2014/main" id="{26E520C9-124A-AB42-AC17-4C557C0B1892}"/>
                 </a:ext>
               </a:extLst>
             </p:cNvPr>
@@ -5546,7 +5547,7 @@
             <p:cNvPr id="62" name="Oval 61">
               <a:extLst>
                 <a:ext uri="{FF2B5EF4-FFF2-40B4-BE49-F238E27FC236}">
-                  <a16:creationId xmlns:a16="http://schemas.microsoft.com/office/drawing/2014/main" id="{D5129498-28A3-D649-B52F-8D571E7DC550}"/>
+                  <a16:creationId xmlns="" xmlns:a16="http://schemas.microsoft.com/office/drawing/2014/main" id="{D5129498-28A3-D649-B52F-8D571E7DC550}"/>
                 </a:ext>
               </a:extLst>
             </p:cNvPr>
@@ -5592,7 +5593,7 @@
             <p:cNvPr id="63" name="Oval 62">
               <a:extLst>
                 <a:ext uri="{FF2B5EF4-FFF2-40B4-BE49-F238E27FC236}">
-                  <a16:creationId xmlns:a16="http://schemas.microsoft.com/office/drawing/2014/main" id="{70A70BE7-7284-2142-B14C-E538299F3475}"/>
+                  <a16:creationId xmlns="" xmlns:a16="http://schemas.microsoft.com/office/drawing/2014/main" id="{70A70BE7-7284-2142-B14C-E538299F3475}"/>
                 </a:ext>
               </a:extLst>
             </p:cNvPr>
@@ -5638,7 +5639,7 @@
             <p:cNvPr id="64" name="Straight Connector 63">
               <a:extLst>
                 <a:ext uri="{FF2B5EF4-FFF2-40B4-BE49-F238E27FC236}">
-                  <a16:creationId xmlns:a16="http://schemas.microsoft.com/office/drawing/2014/main" id="{A6AC5435-4154-9247-86BE-33A7078000C7}"/>
+                  <a16:creationId xmlns="" xmlns:a16="http://schemas.microsoft.com/office/drawing/2014/main" id="{A6AC5435-4154-9247-86BE-33A7078000C7}"/>
                 </a:ext>
               </a:extLst>
             </p:cNvPr>
@@ -5678,7 +5679,7 @@
             <p:cNvPr id="65" name="Straight Connector 64">
               <a:extLst>
                 <a:ext uri="{FF2B5EF4-FFF2-40B4-BE49-F238E27FC236}">
-                  <a16:creationId xmlns:a16="http://schemas.microsoft.com/office/drawing/2014/main" id="{231C7164-9912-9E4F-A64F-01D94572A9EF}"/>
+                  <a16:creationId xmlns="" xmlns:a16="http://schemas.microsoft.com/office/drawing/2014/main" id="{231C7164-9912-9E4F-A64F-01D94572A9EF}"/>
                 </a:ext>
               </a:extLst>
             </p:cNvPr>
@@ -5717,7 +5718,7 @@
             <p:cNvPr id="66" name="Straight Connector 65">
               <a:extLst>
                 <a:ext uri="{FF2B5EF4-FFF2-40B4-BE49-F238E27FC236}">
-                  <a16:creationId xmlns:a16="http://schemas.microsoft.com/office/drawing/2014/main" id="{1A6B4F5F-7A36-8143-9249-47E02A5B4934}"/>
+                  <a16:creationId xmlns="" xmlns:a16="http://schemas.microsoft.com/office/drawing/2014/main" id="{1A6B4F5F-7A36-8143-9249-47E02A5B4934}"/>
                 </a:ext>
               </a:extLst>
             </p:cNvPr>
@@ -5757,7 +5758,7 @@
             <p:cNvPr id="67" name="Straight Connector 66">
               <a:extLst>
                 <a:ext uri="{FF2B5EF4-FFF2-40B4-BE49-F238E27FC236}">
-                  <a16:creationId xmlns:a16="http://schemas.microsoft.com/office/drawing/2014/main" id="{16051331-1194-A043-83BE-29C603BF44F4}"/>
+                  <a16:creationId xmlns="" xmlns:a16="http://schemas.microsoft.com/office/drawing/2014/main" id="{16051331-1194-A043-83BE-29C603BF44F4}"/>
                 </a:ext>
               </a:extLst>
             </p:cNvPr>
@@ -5796,7 +5797,7 @@
             <p:cNvPr id="68" name="Straight Connector 67">
               <a:extLst>
                 <a:ext uri="{FF2B5EF4-FFF2-40B4-BE49-F238E27FC236}">
-                  <a16:creationId xmlns:a16="http://schemas.microsoft.com/office/drawing/2014/main" id="{772F3E67-FAA9-A54E-8084-35529CE58F05}"/>
+                  <a16:creationId xmlns="" xmlns:a16="http://schemas.microsoft.com/office/drawing/2014/main" id="{772F3E67-FAA9-A54E-8084-35529CE58F05}"/>
                 </a:ext>
               </a:extLst>
             </p:cNvPr>
@@ -5835,7 +5836,7 @@
             <p:cNvPr id="69" name="Straight Connector 68">
               <a:extLst>
                 <a:ext uri="{FF2B5EF4-FFF2-40B4-BE49-F238E27FC236}">
-                  <a16:creationId xmlns:a16="http://schemas.microsoft.com/office/drawing/2014/main" id="{39E82FE7-2144-914E-B2ED-620F8FB1ECCC}"/>
+                  <a16:creationId xmlns="" xmlns:a16="http://schemas.microsoft.com/office/drawing/2014/main" id="{39E82FE7-2144-914E-B2ED-620F8FB1ECCC}"/>
                 </a:ext>
               </a:extLst>
             </p:cNvPr>
@@ -5875,7 +5876,7 @@
           <p:cNvPr id="39" name="Group 38">
             <a:extLst>
               <a:ext uri="{FF2B5EF4-FFF2-40B4-BE49-F238E27FC236}">
-                <a16:creationId xmlns:a16="http://schemas.microsoft.com/office/drawing/2014/main" id="{DE0D024D-E610-9C44-B9AB-6B32B11980F5}"/>
+                <a16:creationId xmlns="" xmlns:a16="http://schemas.microsoft.com/office/drawing/2014/main" id="{DE0D024D-E610-9C44-B9AB-6B32B11980F5}"/>
               </a:ext>
             </a:extLst>
           </p:cNvPr>
@@ -5895,7 +5896,7 @@
             <p:cNvPr id="41" name="テキスト ボックス 18">
               <a:extLst>
                 <a:ext uri="{FF2B5EF4-FFF2-40B4-BE49-F238E27FC236}">
-                  <a16:creationId xmlns:a16="http://schemas.microsoft.com/office/drawing/2014/main" id="{1DF7A3EA-0B7B-E047-ADF2-03E2F0237530}"/>
+                  <a16:creationId xmlns="" xmlns:a16="http://schemas.microsoft.com/office/drawing/2014/main" id="{1DF7A3EA-0B7B-E047-ADF2-03E2F0237530}"/>
                 </a:ext>
               </a:extLst>
             </p:cNvPr>
@@ -5932,7 +5933,7 @@
             <p:cNvPr id="47" name="Oval 46">
               <a:extLst>
                 <a:ext uri="{FF2B5EF4-FFF2-40B4-BE49-F238E27FC236}">
-                  <a16:creationId xmlns:a16="http://schemas.microsoft.com/office/drawing/2014/main" id="{C51DCDB6-BC26-AF45-A54A-78FAAED27892}"/>
+                  <a16:creationId xmlns="" xmlns:a16="http://schemas.microsoft.com/office/drawing/2014/main" id="{C51DCDB6-BC26-AF45-A54A-78FAAED27892}"/>
                 </a:ext>
               </a:extLst>
             </p:cNvPr>
@@ -5978,7 +5979,7 @@
             <p:cNvPr id="49" name="Oval 48">
               <a:extLst>
                 <a:ext uri="{FF2B5EF4-FFF2-40B4-BE49-F238E27FC236}">
-                  <a16:creationId xmlns:a16="http://schemas.microsoft.com/office/drawing/2014/main" id="{6D9C70A9-A9AB-514E-8AFF-292DA1D65D75}"/>
+                  <a16:creationId xmlns="" xmlns:a16="http://schemas.microsoft.com/office/drawing/2014/main" id="{6D9C70A9-A9AB-514E-8AFF-292DA1D65D75}"/>
                 </a:ext>
               </a:extLst>
             </p:cNvPr>
@@ -6024,7 +6025,7 @@
             <p:cNvPr id="50" name="Straight Connector 49">
               <a:extLst>
                 <a:ext uri="{FF2B5EF4-FFF2-40B4-BE49-F238E27FC236}">
-                  <a16:creationId xmlns:a16="http://schemas.microsoft.com/office/drawing/2014/main" id="{2B9A51C9-0C81-424D-BC99-0DAC0CD96346}"/>
+                  <a16:creationId xmlns="" xmlns:a16="http://schemas.microsoft.com/office/drawing/2014/main" id="{2B9A51C9-0C81-424D-BC99-0DAC0CD96346}"/>
                 </a:ext>
               </a:extLst>
             </p:cNvPr>
@@ -6064,7 +6065,7 @@
             <p:cNvPr id="70" name="角丸四角形 13">
               <a:extLst>
                 <a:ext uri="{FF2B5EF4-FFF2-40B4-BE49-F238E27FC236}">
-                  <a16:creationId xmlns:a16="http://schemas.microsoft.com/office/drawing/2014/main" id="{565B3D43-791E-B74E-95D6-7806FF813553}"/>
+                  <a16:creationId xmlns="" xmlns:a16="http://schemas.microsoft.com/office/drawing/2014/main" id="{565B3D43-791E-B74E-95D6-7806FF813553}"/>
                 </a:ext>
               </a:extLst>
             </p:cNvPr>
@@ -6119,7 +6120,7 @@
           <p:cNvPr id="71" name="Group 70">
             <a:extLst>
               <a:ext uri="{FF2B5EF4-FFF2-40B4-BE49-F238E27FC236}">
-                <a16:creationId xmlns:a16="http://schemas.microsoft.com/office/drawing/2014/main" id="{EC02AD1C-ED5E-544B-9F26-9A12E126773C}"/>
+                <a16:creationId xmlns="" xmlns:a16="http://schemas.microsoft.com/office/drawing/2014/main" id="{EC02AD1C-ED5E-544B-9F26-9A12E126773C}"/>
               </a:ext>
             </a:extLst>
           </p:cNvPr>
@@ -6139,7 +6140,7 @@
             <p:cNvPr id="72" name="テキスト ボックス 18">
               <a:extLst>
                 <a:ext uri="{FF2B5EF4-FFF2-40B4-BE49-F238E27FC236}">
-                  <a16:creationId xmlns:a16="http://schemas.microsoft.com/office/drawing/2014/main" id="{9B4403F3-B466-C541-8B4E-0CB5B846E735}"/>
+                  <a16:creationId xmlns="" xmlns:a16="http://schemas.microsoft.com/office/drawing/2014/main" id="{9B4403F3-B466-C541-8B4E-0CB5B846E735}"/>
                 </a:ext>
               </a:extLst>
             </p:cNvPr>
@@ -6176,7 +6177,7 @@
             <p:cNvPr id="75" name="Oval 74">
               <a:extLst>
                 <a:ext uri="{FF2B5EF4-FFF2-40B4-BE49-F238E27FC236}">
-                  <a16:creationId xmlns:a16="http://schemas.microsoft.com/office/drawing/2014/main" id="{3F89615E-4D26-E445-AC9F-AD2A1B7118E3}"/>
+                  <a16:creationId xmlns="" xmlns:a16="http://schemas.microsoft.com/office/drawing/2014/main" id="{3F89615E-4D26-E445-AC9F-AD2A1B7118E3}"/>
                 </a:ext>
               </a:extLst>
             </p:cNvPr>
@@ -6222,7 +6223,7 @@
             <p:cNvPr id="76" name="Oval 75">
               <a:extLst>
                 <a:ext uri="{FF2B5EF4-FFF2-40B4-BE49-F238E27FC236}">
-                  <a16:creationId xmlns:a16="http://schemas.microsoft.com/office/drawing/2014/main" id="{153D8E13-80FF-5640-82D3-7E672FDC25F8}"/>
+                  <a16:creationId xmlns="" xmlns:a16="http://schemas.microsoft.com/office/drawing/2014/main" id="{153D8E13-80FF-5640-82D3-7E672FDC25F8}"/>
                 </a:ext>
               </a:extLst>
             </p:cNvPr>
@@ -6268,7 +6269,7 @@
             <p:cNvPr id="82" name="Straight Connector 81">
               <a:extLst>
                 <a:ext uri="{FF2B5EF4-FFF2-40B4-BE49-F238E27FC236}">
-                  <a16:creationId xmlns:a16="http://schemas.microsoft.com/office/drawing/2014/main" id="{4196479E-E391-1B4F-B99B-2EB7D771CDA3}"/>
+                  <a16:creationId xmlns="" xmlns:a16="http://schemas.microsoft.com/office/drawing/2014/main" id="{4196479E-E391-1B4F-B99B-2EB7D771CDA3}"/>
                 </a:ext>
               </a:extLst>
             </p:cNvPr>
@@ -6308,7 +6309,7 @@
             <p:cNvPr id="87" name="角丸四角形 13">
               <a:extLst>
                 <a:ext uri="{FF2B5EF4-FFF2-40B4-BE49-F238E27FC236}">
-                  <a16:creationId xmlns:a16="http://schemas.microsoft.com/office/drawing/2014/main" id="{84C6FA27-51E2-0E4F-A3F8-517FE61B0D3E}"/>
+                  <a16:creationId xmlns="" xmlns:a16="http://schemas.microsoft.com/office/drawing/2014/main" id="{84C6FA27-51E2-0E4F-A3F8-517FE61B0D3E}"/>
                 </a:ext>
               </a:extLst>
             </p:cNvPr>
@@ -6363,7 +6364,7 @@
           <p:cNvPr id="88" name="正方形/長方形 17">
             <a:extLst>
               <a:ext uri="{FF2B5EF4-FFF2-40B4-BE49-F238E27FC236}">
-                <a16:creationId xmlns:a16="http://schemas.microsoft.com/office/drawing/2014/main" id="{D2EE812D-FAAE-9443-A3A9-48A1D99DE467}"/>
+                <a16:creationId xmlns="" xmlns:a16="http://schemas.microsoft.com/office/drawing/2014/main" id="{D2EE812D-FAAE-9443-A3A9-48A1D99DE467}"/>
               </a:ext>
             </a:extLst>
           </p:cNvPr>
@@ -6421,7 +6422,7 @@
           <p:cNvPr id="89" name="正方形/長方形 17">
             <a:extLst>
               <a:ext uri="{FF2B5EF4-FFF2-40B4-BE49-F238E27FC236}">
-                <a16:creationId xmlns:a16="http://schemas.microsoft.com/office/drawing/2014/main" id="{9E9C6593-469B-934D-9C79-2016283FEC15}"/>
+                <a16:creationId xmlns="" xmlns:a16="http://schemas.microsoft.com/office/drawing/2014/main" id="{9E9C6593-469B-934D-9C79-2016283FEC15}"/>
               </a:ext>
             </a:extLst>
           </p:cNvPr>
@@ -6512,8 +6513,8 @@
         </p:nvSpPr>
         <p:spPr>
           <a:xfrm>
-            <a:off x="993732" y="2405641"/>
-            <a:ext cx="4370356" cy="3015044"/>
+            <a:off x="993732" y="2348880"/>
+            <a:ext cx="4370356" cy="3071805"/>
           </a:xfrm>
           <a:prstGeom prst="roundRect">
             <a:avLst/>
@@ -6562,8 +6563,8 @@
         </p:nvSpPr>
         <p:spPr>
           <a:xfrm>
-            <a:off x="3607914" y="4585412"/>
-            <a:ext cx="1105880" cy="369332"/>
+            <a:off x="3726517" y="4024114"/>
+            <a:ext cx="1173783" cy="923330"/>
           </a:xfrm>
           <a:prstGeom prst="rect">
             <a:avLst/>
@@ -6577,8 +6578,25 @@
           <a:lstStyle/>
           <a:p>
             <a:r>
-              <a:rPr kumimoji="1" lang="en-US" altLang="ja-JP" dirty="0" err="1"/>
-              <a:t>EtherCAT</a:t>
+              <a:rPr lang="en-US" altLang="ja-JP" dirty="0" smtClean="0"/>
+              <a:t>ZigBee</a:t>
+            </a:r>
+            <a:r>
+              <a:rPr lang="en-US" altLang="ja-JP" dirty="0"/>
+              <a:t/>
+            </a:r>
+            <a:br>
+              <a:rPr lang="en-US" altLang="ja-JP" dirty="0"/>
+            </a:br>
+            <a:r>
+              <a:rPr lang="en-US" altLang="ja-JP" dirty="0" smtClean="0"/>
+              <a:t>/DECT ULE</a:t>
+            </a:r>
+          </a:p>
+          <a:p>
+            <a:r>
+              <a:rPr kumimoji="1" lang="en-US" altLang="ja-JP" dirty="0" smtClean="0"/>
+              <a:t>/Wi-SUN</a:t>
             </a:r>
             <a:endParaRPr kumimoji="1" lang="ja-JP" altLang="en-US" dirty="0"/>
           </a:p>
@@ -6586,14 +6604,14 @@
       </p:sp>
       <p:sp>
         <p:nvSpPr>
-          <p:cNvPr id="18" name="正方形/長方形 17"/>
+          <p:cNvPr id="39" name="正方形/長方形 38"/>
           <p:cNvSpPr/>
           <p:nvPr/>
         </p:nvSpPr>
         <p:spPr>
           <a:xfrm>
-            <a:off x="2935434" y="4911320"/>
-            <a:ext cx="440003" cy="49966"/>
+            <a:off x="1187625" y="5028234"/>
+            <a:ext cx="2926927" cy="56950"/>
           </a:xfrm>
           <a:prstGeom prst="rect">
             <a:avLst/>
@@ -6638,14 +6656,14 @@
       </p:sp>
       <p:sp>
         <p:nvSpPr>
-          <p:cNvPr id="39" name="正方形/長方形 38"/>
+          <p:cNvPr id="55" name="正方形/長方形 54"/>
           <p:cNvSpPr/>
           <p:nvPr/>
         </p:nvSpPr>
         <p:spPr>
           <a:xfrm>
-            <a:off x="3684991" y="4911320"/>
-            <a:ext cx="1004788" cy="50830"/>
+            <a:off x="1187625" y="3677651"/>
+            <a:ext cx="2592287" cy="53642"/>
           </a:xfrm>
           <a:prstGeom prst="rect">
             <a:avLst/>
@@ -6688,274 +6706,6 @@
           </a:p>
         </p:txBody>
       </p:sp>
-      <p:pic>
-        <p:nvPicPr>
-          <p:cNvPr id="1030" name="Picture 6" descr="C:\Users\knimura\AppData\Local\Microsoft\Windows\Temporary Internet Files\Content.IE5\3RQATYFN\lgi01a201408130500[1].jpg"/>
-          <p:cNvPicPr>
-            <a:picLocks noChangeAspect="1" noChangeArrowheads="1"/>
-          </p:cNvPicPr>
-          <p:nvPr/>
-        </p:nvPicPr>
-        <p:blipFill>
-          <a:blip r:embed="rId2" cstate="print">
-            <a:extLst>
-              <a:ext uri="{28A0092B-C50C-407E-A947-70E740481C1C}">
-                <a14:useLocalDpi xmlns:a14="http://schemas.microsoft.com/office/drawing/2010/main" val="0"/>
-              </a:ext>
-            </a:extLst>
-          </a:blip>
-          <a:srcRect/>
-          <a:stretch>
-            <a:fillRect/>
-          </a:stretch>
-        </p:blipFill>
-        <p:spPr bwMode="auto">
-          <a:xfrm>
-            <a:off x="2467756" y="3805637"/>
-            <a:ext cx="609629" cy="609629"/>
-          </a:xfrm>
-          <a:prstGeom prst="rect">
-            <a:avLst/>
-          </a:prstGeom>
-          <a:noFill/>
-          <a:extLst>
-            <a:ext uri="{909E8E84-426E-40DD-AFC4-6F175D3DCCD1}">
-              <a14:hiddenFill xmlns:a14="http://schemas.microsoft.com/office/drawing/2010/main">
-                <a:solidFill>
-                  <a:srgbClr val="FFFFFF"/>
-                </a:solidFill>
-              </a14:hiddenFill>
-            </a:ext>
-          </a:extLst>
-        </p:spPr>
-      </p:pic>
-      <p:pic>
-        <p:nvPicPr>
-          <p:cNvPr id="43" name="Picture 6" descr="C:\Users\knimura\AppData\Local\Microsoft\Windows\Temporary Internet Files\Content.IE5\3RQATYFN\lgi01a201408130500[1].jpg"/>
-          <p:cNvPicPr>
-            <a:picLocks noChangeAspect="1" noChangeArrowheads="1"/>
-          </p:cNvPicPr>
-          <p:nvPr/>
-        </p:nvPicPr>
-        <p:blipFill>
-          <a:blip r:embed="rId2" cstate="print">
-            <a:extLst>
-              <a:ext uri="{28A0092B-C50C-407E-A947-70E740481C1C}">
-                <a14:useLocalDpi xmlns:a14="http://schemas.microsoft.com/office/drawing/2010/main" val="0"/>
-              </a:ext>
-            </a:extLst>
-          </a:blip>
-          <a:srcRect/>
-          <a:stretch>
-            <a:fillRect/>
-          </a:stretch>
-        </p:blipFill>
-        <p:spPr bwMode="auto">
-          <a:xfrm>
-            <a:off x="3260898" y="3801102"/>
-            <a:ext cx="609629" cy="609629"/>
-          </a:xfrm>
-          <a:prstGeom prst="rect">
-            <a:avLst/>
-          </a:prstGeom>
-          <a:noFill/>
-          <a:extLst>
-            <a:ext uri="{909E8E84-426E-40DD-AFC4-6F175D3DCCD1}">
-              <a14:hiddenFill xmlns:a14="http://schemas.microsoft.com/office/drawing/2010/main">
-                <a:solidFill>
-                  <a:srgbClr val="FFFFFF"/>
-                </a:solidFill>
-              </a14:hiddenFill>
-            </a:ext>
-          </a:extLst>
-        </p:spPr>
-      </p:pic>
-      <p:sp>
-        <p:nvSpPr>
-          <p:cNvPr id="53" name="正方形/長方形 52"/>
-          <p:cNvSpPr/>
-          <p:nvPr/>
-        </p:nvSpPr>
-        <p:spPr>
-          <a:xfrm>
-            <a:off x="2699792" y="3573696"/>
-            <a:ext cx="440003" cy="49966"/>
-          </a:xfrm>
-          <a:prstGeom prst="rect">
-            <a:avLst/>
-          </a:prstGeom>
-          <a:solidFill>
-            <a:schemeClr val="bg1">
-              <a:lumMod val="75000"/>
-            </a:schemeClr>
-          </a:solidFill>
-          <a:ln>
-            <a:solidFill>
-              <a:schemeClr val="bg1">
-                <a:lumMod val="75000"/>
-              </a:schemeClr>
-            </a:solidFill>
-          </a:ln>
-        </p:spPr>
-        <p:style>
-          <a:lnRef idx="2">
-            <a:schemeClr val="accent1">
-              <a:shade val="50000"/>
-            </a:schemeClr>
-          </a:lnRef>
-          <a:fillRef idx="1">
-            <a:schemeClr val="accent1"/>
-          </a:fillRef>
-          <a:effectRef idx="0">
-            <a:schemeClr val="accent1"/>
-          </a:effectRef>
-          <a:fontRef idx="minor">
-            <a:schemeClr val="lt1"/>
-          </a:fontRef>
-        </p:style>
-        <p:txBody>
-          <a:bodyPr rtlCol="0" anchor="ctr"/>
-          <a:lstStyle/>
-          <a:p>
-            <a:pPr algn="ctr"/>
-            <a:endParaRPr kumimoji="1" lang="ja-JP" altLang="en-US"/>
-          </a:p>
-        </p:txBody>
-      </p:sp>
-      <p:sp>
-        <p:nvSpPr>
-          <p:cNvPr id="55" name="正方形/長方形 54"/>
-          <p:cNvSpPr/>
-          <p:nvPr/>
-        </p:nvSpPr>
-        <p:spPr>
-          <a:xfrm>
-            <a:off x="3347864" y="3574560"/>
-            <a:ext cx="890859" cy="49966"/>
-          </a:xfrm>
-          <a:prstGeom prst="rect">
-            <a:avLst/>
-          </a:prstGeom>
-          <a:solidFill>
-            <a:schemeClr val="bg1">
-              <a:lumMod val="75000"/>
-            </a:schemeClr>
-          </a:solidFill>
-          <a:ln>
-            <a:solidFill>
-              <a:schemeClr val="bg1">
-                <a:lumMod val="75000"/>
-              </a:schemeClr>
-            </a:solidFill>
-          </a:ln>
-        </p:spPr>
-        <p:style>
-          <a:lnRef idx="2">
-            <a:schemeClr val="accent1">
-              <a:shade val="50000"/>
-            </a:schemeClr>
-          </a:lnRef>
-          <a:fillRef idx="1">
-            <a:schemeClr val="accent1"/>
-          </a:fillRef>
-          <a:effectRef idx="0">
-            <a:schemeClr val="accent1"/>
-          </a:effectRef>
-          <a:fontRef idx="minor">
-            <a:schemeClr val="lt1"/>
-          </a:fontRef>
-        </p:style>
-        <p:txBody>
-          <a:bodyPr rtlCol="0" anchor="ctr"/>
-          <a:lstStyle/>
-          <a:p>
-            <a:pPr algn="ctr"/>
-            <a:endParaRPr kumimoji="1" lang="ja-JP" altLang="en-US"/>
-          </a:p>
-        </p:txBody>
-      </p:sp>
-      <p:pic>
-        <p:nvPicPr>
-          <p:cNvPr id="56" name="Picture 6" descr="C:\Users\knimura\AppData\Local\Microsoft\Windows\Temporary Internet Files\Content.IE5\3RQATYFN\lgi01a201408130500[1].jpg"/>
-          <p:cNvPicPr>
-            <a:picLocks noChangeAspect="1" noChangeArrowheads="1"/>
-          </p:cNvPicPr>
-          <p:nvPr/>
-        </p:nvPicPr>
-        <p:blipFill>
-          <a:blip r:embed="rId2" cstate="print">
-            <a:extLst>
-              <a:ext uri="{28A0092B-C50C-407E-A947-70E740481C1C}">
-                <a14:useLocalDpi xmlns:a14="http://schemas.microsoft.com/office/drawing/2010/main" val="0"/>
-              </a:ext>
-            </a:extLst>
-          </a:blip>
-          <a:srcRect/>
-          <a:stretch>
-            <a:fillRect/>
-          </a:stretch>
-        </p:blipFill>
-        <p:spPr bwMode="auto">
-          <a:xfrm>
-            <a:off x="2195736" y="2468013"/>
-            <a:ext cx="609629" cy="609629"/>
-          </a:xfrm>
-          <a:prstGeom prst="rect">
-            <a:avLst/>
-          </a:prstGeom>
-          <a:noFill/>
-          <a:extLst>
-            <a:ext uri="{909E8E84-426E-40DD-AFC4-6F175D3DCCD1}">
-              <a14:hiddenFill xmlns:a14="http://schemas.microsoft.com/office/drawing/2010/main">
-                <a:solidFill>
-                  <a:srgbClr val="FFFFFF"/>
-                </a:solidFill>
-              </a14:hiddenFill>
-            </a:ext>
-          </a:extLst>
-        </p:spPr>
-      </p:pic>
-      <p:pic>
-        <p:nvPicPr>
-          <p:cNvPr id="57" name="Picture 6" descr="C:\Users\knimura\AppData\Local\Microsoft\Windows\Temporary Internet Files\Content.IE5\3RQATYFN\lgi01a201408130500[1].jpg"/>
-          <p:cNvPicPr>
-            <a:picLocks noChangeAspect="1" noChangeArrowheads="1"/>
-          </p:cNvPicPr>
-          <p:nvPr/>
-        </p:nvPicPr>
-        <p:blipFill>
-          <a:blip r:embed="rId2" cstate="print">
-            <a:extLst>
-              <a:ext uri="{28A0092B-C50C-407E-A947-70E740481C1C}">
-                <a14:useLocalDpi xmlns:a14="http://schemas.microsoft.com/office/drawing/2010/main" val="0"/>
-              </a:ext>
-            </a:extLst>
-          </a:blip>
-          <a:srcRect/>
-          <a:stretch>
-            <a:fillRect/>
-          </a:stretch>
-        </p:blipFill>
-        <p:spPr bwMode="auto">
-          <a:xfrm>
-            <a:off x="2949724" y="2463478"/>
-            <a:ext cx="609629" cy="609629"/>
-          </a:xfrm>
-          <a:prstGeom prst="rect">
-            <a:avLst/>
-          </a:prstGeom>
-          <a:noFill/>
-          <a:extLst>
-            <a:ext uri="{909E8E84-426E-40DD-AFC4-6F175D3DCCD1}">
-              <a14:hiddenFill xmlns:a14="http://schemas.microsoft.com/office/drawing/2010/main">
-                <a:solidFill>
-                  <a:srgbClr val="FFFFFF"/>
-                </a:solidFill>
-              </a14:hiddenFill>
-            </a:ext>
-          </a:extLst>
-        </p:spPr>
-      </p:pic>
       <p:sp>
         <p:nvSpPr>
           <p:cNvPr id="58" name="テキスト ボックス 57"/>
@@ -6964,8 +6714,8 @@
         </p:nvSpPr>
         <p:spPr>
           <a:xfrm>
-            <a:off x="3284042" y="3264357"/>
-            <a:ext cx="914033" cy="369332"/>
+            <a:off x="3446690" y="2871826"/>
+            <a:ext cx="1177438" cy="646331"/>
           </a:xfrm>
           <a:prstGeom prst="rect">
             <a:avLst/>
@@ -6979,8 +6729,19 @@
           <a:lstStyle/>
           <a:p>
             <a:r>
-              <a:rPr kumimoji="1" lang="en-US" altLang="ja-JP" dirty="0"/>
-              <a:t>RS-485</a:t>
+              <a:rPr lang="en-US" altLang="ja-JP" dirty="0"/>
+              <a:t>K</a:t>
+            </a:r>
+            <a:r>
+              <a:rPr lang="en-US" altLang="ja-JP" dirty="0" smtClean="0"/>
+              <a:t>NX</a:t>
+            </a:r>
+            <a:br>
+              <a:rPr lang="en-US" altLang="ja-JP" dirty="0" smtClean="0"/>
+            </a:br>
+            <a:r>
+              <a:rPr lang="en-US" altLang="ja-JP" dirty="0" smtClean="0"/>
+              <a:t>/ECHONET</a:t>
             </a:r>
             <a:endParaRPr kumimoji="1" lang="ja-JP" altLang="en-US" dirty="0"/>
           </a:p>
@@ -6994,7 +6755,7 @@
         </p:nvSpPr>
         <p:spPr>
           <a:xfrm>
-            <a:off x="3648305" y="1772816"/>
+            <a:off x="3648305" y="1009543"/>
             <a:ext cx="2880320" cy="1237712"/>
           </a:xfrm>
           <a:prstGeom prst="cloud">
@@ -7132,6 +6893,1848 @@
           <p:nvPr/>
         </p:nvPicPr>
         <p:blipFill>
+          <a:blip r:embed="rId2" cstate="print">
+            <a:extLst>
+              <a:ext uri="{28A0092B-C50C-407E-A947-70E740481C1C}">
+                <a14:useLocalDpi xmlns:a14="http://schemas.microsoft.com/office/drawing/2010/main"/>
+              </a:ext>
+            </a:extLst>
+          </a:blip>
+          <a:srcRect/>
+          <a:stretch>
+            <a:fillRect/>
+          </a:stretch>
+        </p:blipFill>
+        <p:spPr bwMode="auto">
+          <a:xfrm>
+            <a:off x="7762112" y="2079463"/>
+            <a:ext cx="1123122" cy="811857"/>
+          </a:xfrm>
+          <a:prstGeom prst="rect">
+            <a:avLst/>
+          </a:prstGeom>
+          <a:noFill/>
+          <a:extLst>
+            <a:ext uri="{909E8E84-426E-40DD-AFC4-6F175D3DCCD1}">
+              <a14:hiddenFill xmlns:a14="http://schemas.microsoft.com/office/drawing/2010/main">
+                <a:solidFill>
+                  <a:srgbClr val="FFFFFF"/>
+                </a:solidFill>
+              </a14:hiddenFill>
+            </a:ext>
+          </a:extLst>
+        </p:spPr>
+      </p:pic>
+      <p:sp>
+        <p:nvSpPr>
+          <p:cNvPr id="48" name="角丸四角形 47"/>
+          <p:cNvSpPr/>
+          <p:nvPr/>
+        </p:nvSpPr>
+        <p:spPr>
+          <a:xfrm>
+            <a:off x="6830870" y="1319068"/>
+            <a:ext cx="931242" cy="479649"/>
+          </a:xfrm>
+          <a:prstGeom prst="roundRect">
+            <a:avLst/>
+          </a:prstGeom>
+          <a:solidFill>
+            <a:schemeClr val="bg1"/>
+          </a:solidFill>
+          <a:ln w="57150">
+            <a:solidFill>
+              <a:schemeClr val="bg1">
+                <a:lumMod val="75000"/>
+              </a:schemeClr>
+            </a:solidFill>
+          </a:ln>
+        </p:spPr>
+        <p:style>
+          <a:lnRef idx="2">
+            <a:schemeClr val="accent1">
+              <a:shade val="50000"/>
+            </a:schemeClr>
+          </a:lnRef>
+          <a:fillRef idx="1">
+            <a:schemeClr val="accent1"/>
+          </a:fillRef>
+          <a:effectRef idx="0">
+            <a:schemeClr val="accent1"/>
+          </a:effectRef>
+          <a:fontRef idx="minor">
+            <a:schemeClr val="lt1"/>
+          </a:fontRef>
+        </p:style>
+        <p:txBody>
+          <a:bodyPr rtlCol="0" anchor="ctr"/>
+          <a:lstStyle/>
+          <a:p>
+            <a:pPr algn="ctr"/>
+            <a:endParaRPr kumimoji="1" lang="ja-JP" altLang="en-US"/>
+          </a:p>
+        </p:txBody>
+      </p:sp>
+      <p:sp>
+        <p:nvSpPr>
+          <p:cNvPr id="49" name="テキスト ボックス 48"/>
+          <p:cNvSpPr txBox="1"/>
+          <p:nvPr/>
+        </p:nvSpPr>
+        <p:spPr>
+          <a:xfrm>
+            <a:off x="6898719" y="1342166"/>
+            <a:ext cx="570413" cy="430887"/>
+          </a:xfrm>
+          <a:prstGeom prst="rect">
+            <a:avLst/>
+          </a:prstGeom>
+          <a:noFill/>
+        </p:spPr>
+        <p:txBody>
+          <a:bodyPr wrap="none" lIns="0" tIns="0" rIns="0" bIns="0" rtlCol="0">
+            <a:spAutoFit/>
+          </a:bodyPr>
+          <a:lstStyle/>
+          <a:p>
+            <a:r>
+              <a:rPr lang="en-US" altLang="ja-JP" sz="1400" dirty="0" smtClean="0"/>
+              <a:t>Remote</a:t>
+            </a:r>
+            <a:br>
+              <a:rPr lang="en-US" altLang="ja-JP" sz="1400" dirty="0" smtClean="0"/>
+            </a:br>
+            <a:r>
+              <a:rPr lang="en-US" altLang="ja-JP" sz="1400" dirty="0" smtClean="0"/>
+              <a:t>Access</a:t>
+            </a:r>
+            <a:endParaRPr kumimoji="1" lang="ja-JP" altLang="en-US" sz="1400" dirty="0"/>
+          </a:p>
+        </p:txBody>
+      </p:sp>
+      <p:sp>
+        <p:nvSpPr>
+          <p:cNvPr id="51" name="正方形/長方形 50"/>
+          <p:cNvSpPr/>
+          <p:nvPr/>
+        </p:nvSpPr>
+        <p:spPr>
+          <a:xfrm rot="16200000">
+            <a:off x="3785289" y="2778364"/>
+            <a:ext cx="1768784" cy="45719"/>
+          </a:xfrm>
+          <a:prstGeom prst="rect">
+            <a:avLst/>
+          </a:prstGeom>
+          <a:solidFill>
+            <a:schemeClr val="bg1">
+              <a:lumMod val="75000"/>
+            </a:schemeClr>
+          </a:solidFill>
+          <a:ln>
+            <a:solidFill>
+              <a:schemeClr val="bg1">
+                <a:lumMod val="75000"/>
+              </a:schemeClr>
+            </a:solidFill>
+          </a:ln>
+        </p:spPr>
+        <p:style>
+          <a:lnRef idx="2">
+            <a:schemeClr val="accent1">
+              <a:shade val="50000"/>
+            </a:schemeClr>
+          </a:lnRef>
+          <a:fillRef idx="1">
+            <a:schemeClr val="accent1"/>
+          </a:fillRef>
+          <a:effectRef idx="0">
+            <a:schemeClr val="accent1"/>
+          </a:effectRef>
+          <a:fontRef idx="minor">
+            <a:schemeClr val="lt1"/>
+          </a:fontRef>
+        </p:style>
+        <p:txBody>
+          <a:bodyPr rtlCol="0" anchor="ctr"/>
+          <a:lstStyle/>
+          <a:p>
+            <a:pPr algn="ctr"/>
+            <a:endParaRPr kumimoji="1" lang="ja-JP" altLang="en-US"/>
+          </a:p>
+        </p:txBody>
+      </p:sp>
+      <p:sp>
+        <p:nvSpPr>
+          <p:cNvPr id="62" name="正方形/長方形 61"/>
+          <p:cNvSpPr/>
+          <p:nvPr/>
+        </p:nvSpPr>
+        <p:spPr>
+          <a:xfrm>
+            <a:off x="6349562" y="1551709"/>
+            <a:ext cx="454686" cy="45719"/>
+          </a:xfrm>
+          <a:prstGeom prst="rect">
+            <a:avLst/>
+          </a:prstGeom>
+          <a:solidFill>
+            <a:schemeClr val="bg1">
+              <a:lumMod val="75000"/>
+            </a:schemeClr>
+          </a:solidFill>
+          <a:ln>
+            <a:solidFill>
+              <a:schemeClr val="bg1">
+                <a:lumMod val="75000"/>
+              </a:schemeClr>
+            </a:solidFill>
+          </a:ln>
+        </p:spPr>
+        <p:style>
+          <a:lnRef idx="2">
+            <a:schemeClr val="accent1">
+              <a:shade val="50000"/>
+            </a:schemeClr>
+          </a:lnRef>
+          <a:fillRef idx="1">
+            <a:schemeClr val="accent1"/>
+          </a:fillRef>
+          <a:effectRef idx="0">
+            <a:schemeClr val="accent1"/>
+          </a:effectRef>
+          <a:fontRef idx="minor">
+            <a:schemeClr val="lt1"/>
+          </a:fontRef>
+        </p:style>
+        <p:txBody>
+          <a:bodyPr rtlCol="0" anchor="ctr"/>
+          <a:lstStyle/>
+          <a:p>
+            <a:pPr algn="ctr"/>
+            <a:endParaRPr kumimoji="1" lang="ja-JP" altLang="en-US"/>
+          </a:p>
+        </p:txBody>
+      </p:sp>
+      <p:sp>
+        <p:nvSpPr>
+          <p:cNvPr id="46" name="正方形/長方形 45"/>
+          <p:cNvSpPr/>
+          <p:nvPr/>
+        </p:nvSpPr>
+        <p:spPr>
+          <a:xfrm rot="16200000">
+            <a:off x="3605828" y="3387391"/>
+            <a:ext cx="3102068" cy="45719"/>
+          </a:xfrm>
+          <a:prstGeom prst="rect">
+            <a:avLst/>
+          </a:prstGeom>
+          <a:solidFill>
+            <a:schemeClr val="bg1">
+              <a:lumMod val="75000"/>
+            </a:schemeClr>
+          </a:solidFill>
+          <a:ln>
+            <a:solidFill>
+              <a:schemeClr val="bg1">
+                <a:lumMod val="75000"/>
+              </a:schemeClr>
+            </a:solidFill>
+          </a:ln>
+        </p:spPr>
+        <p:style>
+          <a:lnRef idx="2">
+            <a:schemeClr val="accent1">
+              <a:shade val="50000"/>
+            </a:schemeClr>
+          </a:lnRef>
+          <a:fillRef idx="1">
+            <a:schemeClr val="accent1"/>
+          </a:fillRef>
+          <a:effectRef idx="0">
+            <a:schemeClr val="accent1"/>
+          </a:effectRef>
+          <a:fontRef idx="minor">
+            <a:schemeClr val="lt1"/>
+          </a:fontRef>
+        </p:style>
+        <p:txBody>
+          <a:bodyPr rtlCol="0" anchor="ctr"/>
+          <a:lstStyle/>
+          <a:p>
+            <a:pPr algn="ctr"/>
+            <a:endParaRPr kumimoji="1" lang="ja-JP" altLang="en-US"/>
+          </a:p>
+        </p:txBody>
+      </p:sp>
+      <p:pic>
+        <p:nvPicPr>
+          <p:cNvPr id="4" name="図 3"/>
+          <p:cNvPicPr>
+            <a:picLocks noChangeAspect="1"/>
+          </p:cNvPicPr>
+          <p:nvPr/>
+        </p:nvPicPr>
+        <p:blipFill>
+          <a:blip r:embed="rId3" cstate="print">
+            <a:extLst>
+              <a:ext uri="{28A0092B-C50C-407E-A947-70E740481C1C}">
+                <a14:useLocalDpi xmlns:a14="http://schemas.microsoft.com/office/drawing/2010/main"/>
+              </a:ext>
+            </a:extLst>
+          </a:blip>
+          <a:stretch>
+            <a:fillRect/>
+          </a:stretch>
+        </p:blipFill>
+        <p:spPr>
+          <a:xfrm>
+            <a:off x="5028505" y="1309411"/>
+            <a:ext cx="445173" cy="637976"/>
+          </a:xfrm>
+          <a:prstGeom prst="rect">
+            <a:avLst/>
+          </a:prstGeom>
+        </p:spPr>
+      </p:pic>
+      <p:sp>
+        <p:nvSpPr>
+          <p:cNvPr id="67" name="角丸四角形 66"/>
+          <p:cNvSpPr/>
+          <p:nvPr/>
+        </p:nvSpPr>
+        <p:spPr>
+          <a:xfrm>
+            <a:off x="5573862" y="1323128"/>
+            <a:ext cx="739378" cy="479649"/>
+          </a:xfrm>
+          <a:prstGeom prst="roundRect">
+            <a:avLst/>
+          </a:prstGeom>
+          <a:solidFill>
+            <a:schemeClr val="bg1"/>
+          </a:solidFill>
+          <a:ln w="57150">
+            <a:solidFill>
+              <a:schemeClr val="bg1">
+                <a:lumMod val="75000"/>
+              </a:schemeClr>
+            </a:solidFill>
+          </a:ln>
+        </p:spPr>
+        <p:style>
+          <a:lnRef idx="2">
+            <a:schemeClr val="accent1">
+              <a:shade val="50000"/>
+            </a:schemeClr>
+          </a:lnRef>
+          <a:fillRef idx="1">
+            <a:schemeClr val="accent1"/>
+          </a:fillRef>
+          <a:effectRef idx="0">
+            <a:schemeClr val="accent1"/>
+          </a:effectRef>
+          <a:fontRef idx="minor">
+            <a:schemeClr val="lt1"/>
+          </a:fontRef>
+        </p:style>
+        <p:txBody>
+          <a:bodyPr rtlCol="0" anchor="ctr"/>
+          <a:lstStyle/>
+          <a:p>
+            <a:pPr algn="ctr"/>
+            <a:endParaRPr kumimoji="1" lang="ja-JP" altLang="en-US"/>
+          </a:p>
+        </p:txBody>
+      </p:sp>
+      <p:sp>
+        <p:nvSpPr>
+          <p:cNvPr id="68" name="テキスト ボックス 67"/>
+          <p:cNvSpPr txBox="1"/>
+          <p:nvPr/>
+        </p:nvSpPr>
+        <p:spPr>
+          <a:xfrm>
+            <a:off x="5614612" y="1442750"/>
+            <a:ext cx="645177" cy="215444"/>
+          </a:xfrm>
+          <a:prstGeom prst="rect">
+            <a:avLst/>
+          </a:prstGeom>
+          <a:solidFill>
+            <a:schemeClr val="bg1"/>
+          </a:solidFill>
+        </p:spPr>
+        <p:txBody>
+          <a:bodyPr wrap="none" lIns="0" tIns="0" rIns="0" bIns="0" rtlCol="0">
+            <a:spAutoFit/>
+          </a:bodyPr>
+          <a:lstStyle/>
+          <a:p>
+            <a:r>
+              <a:rPr lang="en-US" altLang="ja-JP" sz="1400" dirty="0"/>
+              <a:t>Services</a:t>
+            </a:r>
+            <a:endParaRPr kumimoji="1" lang="ja-JP" altLang="en-US" sz="1400" dirty="0"/>
+          </a:p>
+        </p:txBody>
+      </p:sp>
+      <p:sp>
+        <p:nvSpPr>
+          <p:cNvPr id="33" name="Gleichschenkliges Dreieck 32"/>
+          <p:cNvSpPr/>
+          <p:nvPr/>
+        </p:nvSpPr>
+        <p:spPr>
+          <a:xfrm rot="1258602">
+            <a:off x="854864" y="1790807"/>
+            <a:ext cx="1412094" cy="1070390"/>
+          </a:xfrm>
+          <a:prstGeom prst="triangle">
+            <a:avLst>
+              <a:gd name="adj" fmla="val 69983"/>
+            </a:avLst>
+          </a:prstGeom>
+          <a:solidFill>
+            <a:schemeClr val="bg1"/>
+          </a:solidFill>
+          <a:ln>
+            <a:noFill/>
+          </a:ln>
+        </p:spPr>
+        <p:style>
+          <a:lnRef idx="2">
+            <a:schemeClr val="accent1">
+              <a:shade val="50000"/>
+            </a:schemeClr>
+          </a:lnRef>
+          <a:fillRef idx="1">
+            <a:schemeClr val="accent1"/>
+          </a:fillRef>
+          <a:effectRef idx="0">
+            <a:schemeClr val="accent1"/>
+          </a:effectRef>
+          <a:fontRef idx="minor">
+            <a:schemeClr val="lt1"/>
+          </a:fontRef>
+        </p:style>
+        <p:txBody>
+          <a:bodyPr rtlCol="0" anchor="ctr"/>
+          <a:lstStyle/>
+          <a:p>
+            <a:pPr algn="ctr"/>
+            <a:endParaRPr lang="de-DE"/>
+          </a:p>
+        </p:txBody>
+      </p:sp>
+      <p:pic>
+        <p:nvPicPr>
+          <p:cNvPr id="1026" name="Picture 2" descr="https://1.bp.blogspot.com/-oMgIvKQd3t8/V2vXnEgy8zI/AAAAAAAA73k/e0EfqlNMyAY4pRGZipIM0rZBapAEQ3u4ACLcB/s800/building_house1.png"/>
+          <p:cNvPicPr>
+            <a:picLocks noChangeAspect="1" noChangeArrowheads="1"/>
+          </p:cNvPicPr>
+          <p:nvPr/>
+        </p:nvPicPr>
+        <p:blipFill>
+          <a:blip r:embed="rId4" cstate="print">
+            <a:extLst>
+              <a:ext uri="{28A0092B-C50C-407E-A947-70E740481C1C}">
+                <a14:useLocalDpi xmlns:a14="http://schemas.microsoft.com/office/drawing/2010/main"/>
+              </a:ext>
+            </a:extLst>
+          </a:blip>
+          <a:srcRect/>
+          <a:stretch>
+            <a:fillRect/>
+          </a:stretch>
+        </p:blipFill>
+        <p:spPr bwMode="auto">
+          <a:xfrm>
+            <a:off x="877462" y="1550211"/>
+            <a:ext cx="1240015" cy="1147962"/>
+          </a:xfrm>
+          <a:prstGeom prst="rect">
+            <a:avLst/>
+          </a:prstGeom>
+          <a:noFill/>
+          <a:extLst>
+            <a:ext uri="{909E8E84-426E-40DD-AFC4-6F175D3DCCD1}">
+              <a14:hiddenFill xmlns:a14="http://schemas.microsoft.com/office/drawing/2010/main">
+                <a:solidFill>
+                  <a:srgbClr val="FFFFFF"/>
+                </a:solidFill>
+              </a14:hiddenFill>
+            </a:ext>
+          </a:extLst>
+        </p:spPr>
+      </p:pic>
+      <p:pic>
+        <p:nvPicPr>
+          <p:cNvPr id="34" name="図 33"/>
+          <p:cNvPicPr>
+            <a:picLocks noChangeAspect="1"/>
+          </p:cNvPicPr>
+          <p:nvPr/>
+        </p:nvPicPr>
+        <p:blipFill>
+          <a:blip r:embed="rId3" cstate="print">
+            <a:extLst>
+              <a:ext uri="{28A0092B-C50C-407E-A947-70E740481C1C}">
+                <a14:useLocalDpi xmlns:a14="http://schemas.microsoft.com/office/drawing/2010/main"/>
+              </a:ext>
+            </a:extLst>
+          </a:blip>
+          <a:stretch>
+            <a:fillRect/>
+          </a:stretch>
+        </p:blipFill>
+        <p:spPr>
+          <a:xfrm>
+            <a:off x="4544922" y="1323380"/>
+            <a:ext cx="445173" cy="637976"/>
+          </a:xfrm>
+          <a:prstGeom prst="rect">
+            <a:avLst/>
+          </a:prstGeom>
+        </p:spPr>
+      </p:pic>
+      <p:pic>
+        <p:nvPicPr>
+          <p:cNvPr id="40" name="図 39"/>
+          <p:cNvPicPr>
+            <a:picLocks noChangeAspect="1"/>
+          </p:cNvPicPr>
+          <p:nvPr/>
+        </p:nvPicPr>
+        <p:blipFill>
+          <a:blip r:embed="rId5" cstate="print">
+            <a:extLst>
+              <a:ext uri="{28A0092B-C50C-407E-A947-70E740481C1C}">
+                <a14:useLocalDpi xmlns:a14="http://schemas.microsoft.com/office/drawing/2010/main"/>
+              </a:ext>
+            </a:extLst>
+          </a:blip>
+          <a:stretch>
+            <a:fillRect/>
+          </a:stretch>
+        </p:blipFill>
+        <p:spPr>
+          <a:xfrm>
+            <a:off x="2197949" y="2411092"/>
+            <a:ext cx="1010853" cy="509037"/>
+          </a:xfrm>
+          <a:prstGeom prst="rect">
+            <a:avLst/>
+          </a:prstGeom>
+        </p:spPr>
+      </p:pic>
+      <p:sp>
+        <p:nvSpPr>
+          <p:cNvPr id="47" name="正方形/長方形 46"/>
+          <p:cNvSpPr/>
+          <p:nvPr/>
+        </p:nvSpPr>
+        <p:spPr>
+          <a:xfrm>
+            <a:off x="3158964" y="2602833"/>
+            <a:ext cx="1046396" cy="66890"/>
+          </a:xfrm>
+          <a:prstGeom prst="rect">
+            <a:avLst/>
+          </a:prstGeom>
+          <a:solidFill>
+            <a:schemeClr val="bg1">
+              <a:lumMod val="75000"/>
+            </a:schemeClr>
+          </a:solidFill>
+          <a:ln>
+            <a:solidFill>
+              <a:schemeClr val="bg1">
+                <a:lumMod val="75000"/>
+              </a:schemeClr>
+            </a:solidFill>
+          </a:ln>
+        </p:spPr>
+        <p:style>
+          <a:lnRef idx="2">
+            <a:schemeClr val="accent1">
+              <a:shade val="50000"/>
+            </a:schemeClr>
+          </a:lnRef>
+          <a:fillRef idx="1">
+            <a:schemeClr val="accent1"/>
+          </a:fillRef>
+          <a:effectRef idx="0">
+            <a:schemeClr val="accent1"/>
+          </a:effectRef>
+          <a:fontRef idx="minor">
+            <a:schemeClr val="lt1"/>
+          </a:fontRef>
+        </p:style>
+        <p:txBody>
+          <a:bodyPr rtlCol="0" anchor="ctr"/>
+          <a:lstStyle/>
+          <a:p>
+            <a:pPr algn="ctr"/>
+            <a:endParaRPr kumimoji="1" lang="ja-JP" altLang="en-US"/>
+          </a:p>
+        </p:txBody>
+      </p:sp>
+      <p:pic>
+        <p:nvPicPr>
+          <p:cNvPr id="59" name="図 24"/>
+          <p:cNvPicPr>
+            <a:picLocks noChangeAspect="1"/>
+          </p:cNvPicPr>
+          <p:nvPr/>
+        </p:nvPicPr>
+        <p:blipFill>
+          <a:blip r:embed="rId6" cstate="print">
+            <a:extLst>
+              <a:ext uri="{28A0092B-C50C-407E-A947-70E740481C1C}">
+                <a14:useLocalDpi xmlns:a14="http://schemas.microsoft.com/office/drawing/2010/main"/>
+              </a:ext>
+            </a:extLst>
+          </a:blip>
+          <a:stretch>
+            <a:fillRect/>
+          </a:stretch>
+        </p:blipFill>
+        <p:spPr>
+          <a:xfrm>
+            <a:off x="4290734" y="3574753"/>
+            <a:ext cx="653908" cy="261563"/>
+          </a:xfrm>
+          <a:prstGeom prst="rect">
+            <a:avLst/>
+          </a:prstGeom>
+        </p:spPr>
+      </p:pic>
+      <p:pic>
+        <p:nvPicPr>
+          <p:cNvPr id="60" name="図 24"/>
+          <p:cNvPicPr>
+            <a:picLocks noChangeAspect="1"/>
+          </p:cNvPicPr>
+          <p:nvPr/>
+        </p:nvPicPr>
+        <p:blipFill>
+          <a:blip r:embed="rId6" cstate="print">
+            <a:extLst>
+              <a:ext uri="{28A0092B-C50C-407E-A947-70E740481C1C}">
+                <a14:useLocalDpi xmlns:a14="http://schemas.microsoft.com/office/drawing/2010/main"/>
+              </a:ext>
+            </a:extLst>
+          </a:blip>
+          <a:stretch>
+            <a:fillRect/>
+          </a:stretch>
+        </p:blipFill>
+        <p:spPr>
+          <a:xfrm>
+            <a:off x="4621356" y="4938224"/>
+            <a:ext cx="653908" cy="261563"/>
+          </a:xfrm>
+          <a:prstGeom prst="rect">
+            <a:avLst/>
+          </a:prstGeom>
+        </p:spPr>
+      </p:pic>
+      <p:pic>
+        <p:nvPicPr>
+          <p:cNvPr id="2" name="Picture 4" descr="ãã¦ã³ã©ã¤ãã®ã¤ã©ã¹ã"/>
+          <p:cNvPicPr>
+            <a:picLocks noChangeAspect="1" noChangeArrowheads="1"/>
+          </p:cNvPicPr>
+          <p:nvPr/>
+        </p:nvPicPr>
+        <p:blipFill rotWithShape="1">
+          <a:blip r:embed="rId7" cstate="print">
+            <a:extLst>
+              <a:ext uri="{28A0092B-C50C-407E-A947-70E740481C1C}">
+                <a14:useLocalDpi xmlns:a14="http://schemas.microsoft.com/office/drawing/2010/main"/>
+              </a:ext>
+            </a:extLst>
+          </a:blip>
+          <a:srcRect/>
+          <a:stretch/>
+        </p:blipFill>
+        <p:spPr bwMode="auto">
+          <a:xfrm>
+            <a:off x="1243025" y="3139433"/>
+            <a:ext cx="703556" cy="504056"/>
+          </a:xfrm>
+          <a:prstGeom prst="rect">
+            <a:avLst/>
+          </a:prstGeom>
+          <a:noFill/>
+          <a:extLst>
+            <a:ext uri="{909E8E84-426E-40DD-AFC4-6F175D3DCCD1}">
+              <a14:hiddenFill xmlns:a14="http://schemas.microsoft.com/office/drawing/2010/main">
+                <a:solidFill>
+                  <a:srgbClr val="FFFFFF"/>
+                </a:solidFill>
+              </a14:hiddenFill>
+            </a:ext>
+          </a:extLst>
+        </p:spPr>
+      </p:pic>
+      <p:pic>
+        <p:nvPicPr>
+          <p:cNvPr id="3" name="Picture 6" descr="https://2.bp.blogspot.com/-Pz6GBclm23s/XG_PWG8Rz8I/AAAAAAABRuo/UweXg6uLXjE4cCiWU6RoWNDUlnfvgbdEACLcBGAs/s800/beacon_denpa_hasshinki.png"/>
+          <p:cNvPicPr>
+            <a:picLocks noChangeAspect="1" noChangeArrowheads="1"/>
+          </p:cNvPicPr>
+          <p:nvPr/>
+        </p:nvPicPr>
+        <p:blipFill>
+          <a:blip r:embed="rId8" cstate="print">
+            <a:extLst>
+              <a:ext uri="{28A0092B-C50C-407E-A947-70E740481C1C}">
+                <a14:useLocalDpi xmlns:a14="http://schemas.microsoft.com/office/drawing/2010/main"/>
+              </a:ext>
+            </a:extLst>
+          </a:blip>
+          <a:srcRect/>
+          <a:stretch>
+            <a:fillRect/>
+          </a:stretch>
+        </p:blipFill>
+        <p:spPr bwMode="auto">
+          <a:xfrm>
+            <a:off x="3814366" y="3406067"/>
+            <a:ext cx="476524" cy="476524"/>
+          </a:xfrm>
+          <a:prstGeom prst="rect">
+            <a:avLst/>
+          </a:prstGeom>
+          <a:noFill/>
+          <a:extLst>
+            <a:ext uri="{909E8E84-426E-40DD-AFC4-6F175D3DCCD1}">
+              <a14:hiddenFill xmlns:a14="http://schemas.microsoft.com/office/drawing/2010/main">
+                <a:solidFill>
+                  <a:srgbClr val="FFFFFF"/>
+                </a:solidFill>
+              </a14:hiddenFill>
+            </a:ext>
+          </a:extLst>
+        </p:spPr>
+      </p:pic>
+      <p:pic>
+        <p:nvPicPr>
+          <p:cNvPr id="63" name="Picture 6" descr="https://2.bp.blogspot.com/-Pz6GBclm23s/XG_PWG8Rz8I/AAAAAAABRuo/UweXg6uLXjE4cCiWU6RoWNDUlnfvgbdEACLcBGAs/s800/beacon_denpa_hasshinki.png"/>
+          <p:cNvPicPr>
+            <a:picLocks noChangeAspect="1" noChangeArrowheads="1"/>
+          </p:cNvPicPr>
+          <p:nvPr/>
+        </p:nvPicPr>
+        <p:blipFill>
+          <a:blip r:embed="rId8" cstate="print">
+            <a:extLst>
+              <a:ext uri="{28A0092B-C50C-407E-A947-70E740481C1C}">
+                <a14:useLocalDpi xmlns:a14="http://schemas.microsoft.com/office/drawing/2010/main"/>
+              </a:ext>
+            </a:extLst>
+          </a:blip>
+          <a:srcRect/>
+          <a:stretch>
+            <a:fillRect/>
+          </a:stretch>
+        </p:blipFill>
+        <p:spPr bwMode="auto">
+          <a:xfrm>
+            <a:off x="4156131" y="4854478"/>
+            <a:ext cx="476524" cy="476524"/>
+          </a:xfrm>
+          <a:prstGeom prst="rect">
+            <a:avLst/>
+          </a:prstGeom>
+          <a:noFill/>
+          <a:extLst>
+            <a:ext uri="{909E8E84-426E-40DD-AFC4-6F175D3DCCD1}">
+              <a14:hiddenFill xmlns:a14="http://schemas.microsoft.com/office/drawing/2010/main">
+                <a:solidFill>
+                  <a:srgbClr val="FFFFFF"/>
+                </a:solidFill>
+              </a14:hiddenFill>
+            </a:ext>
+          </a:extLst>
+        </p:spPr>
+      </p:pic>
+      <p:pic>
+        <p:nvPicPr>
+          <p:cNvPr id="1032" name="Picture 8" descr="https://4.bp.blogspot.com/-5qCks0BfvGU/WJmw2Gus3_I/AAAAAAABBjQ/dLceQBq2uFMnuh2BeELak48gYMB21bnEgCLcB/s800/key_cylinder.png"/>
+          <p:cNvPicPr>
+            <a:picLocks noChangeAspect="1" noChangeArrowheads="1"/>
+          </p:cNvPicPr>
+          <p:nvPr/>
+        </p:nvPicPr>
+        <p:blipFill>
+          <a:blip r:embed="rId9" cstate="print">
+            <a:extLst>
+              <a:ext uri="{28A0092B-C50C-407E-A947-70E740481C1C}">
+                <a14:useLocalDpi xmlns:a14="http://schemas.microsoft.com/office/drawing/2010/main"/>
+              </a:ext>
+            </a:extLst>
+          </a:blip>
+          <a:srcRect/>
+          <a:stretch>
+            <a:fillRect/>
+          </a:stretch>
+        </p:blipFill>
+        <p:spPr bwMode="auto">
+          <a:xfrm>
+            <a:off x="2067406" y="3126738"/>
+            <a:ext cx="416362" cy="391419"/>
+          </a:xfrm>
+          <a:prstGeom prst="rect">
+            <a:avLst/>
+          </a:prstGeom>
+          <a:noFill/>
+          <a:extLst>
+            <a:ext uri="{909E8E84-426E-40DD-AFC4-6F175D3DCCD1}">
+              <a14:hiddenFill xmlns:a14="http://schemas.microsoft.com/office/drawing/2010/main">
+                <a:solidFill>
+                  <a:srgbClr val="FFFFFF"/>
+                </a:solidFill>
+              </a14:hiddenFill>
+            </a:ext>
+          </a:extLst>
+        </p:spPr>
+      </p:pic>
+      <p:pic>
+        <p:nvPicPr>
+          <p:cNvPr id="1034" name="Picture 10" descr="ç£è¦ã«ã¡ã©ã»é²ç¯ã«ã¡ã©ã®ã¤ã©ã¹ã"/>
+          <p:cNvPicPr>
+            <a:picLocks noChangeAspect="1" noChangeArrowheads="1"/>
+          </p:cNvPicPr>
+          <p:nvPr/>
+        </p:nvPicPr>
+        <p:blipFill>
+          <a:blip r:embed="rId10" cstate="print">
+            <a:extLst>
+              <a:ext uri="{28A0092B-C50C-407E-A947-70E740481C1C}">
+                <a14:useLocalDpi xmlns:a14="http://schemas.microsoft.com/office/drawing/2010/main"/>
+              </a:ext>
+            </a:extLst>
+          </a:blip>
+          <a:srcRect/>
+          <a:stretch>
+            <a:fillRect/>
+          </a:stretch>
+        </p:blipFill>
+        <p:spPr bwMode="auto">
+          <a:xfrm>
+            <a:off x="1290139" y="4396680"/>
+            <a:ext cx="541544" cy="541544"/>
+          </a:xfrm>
+          <a:prstGeom prst="rect">
+            <a:avLst/>
+          </a:prstGeom>
+          <a:noFill/>
+          <a:extLst>
+            <a:ext uri="{909E8E84-426E-40DD-AFC4-6F175D3DCCD1}">
+              <a14:hiddenFill xmlns:a14="http://schemas.microsoft.com/office/drawing/2010/main">
+                <a:solidFill>
+                  <a:srgbClr val="FFFFFF"/>
+                </a:solidFill>
+              </a14:hiddenFill>
+            </a:ext>
+          </a:extLst>
+        </p:spPr>
+      </p:pic>
+      <p:pic>
+        <p:nvPicPr>
+          <p:cNvPr id="1036" name="Picture 12" descr="ã¹ãã¼ãã¡ã¼ã¿ã¼ã®ã¤ã©ã¹ã"/>
+          <p:cNvPicPr>
+            <a:picLocks noChangeAspect="1" noChangeArrowheads="1"/>
+          </p:cNvPicPr>
+          <p:nvPr/>
+        </p:nvPicPr>
+        <p:blipFill>
+          <a:blip r:embed="rId11" cstate="print">
+            <a:extLst>
+              <a:ext uri="{28A0092B-C50C-407E-A947-70E740481C1C}">
+                <a14:useLocalDpi xmlns:a14="http://schemas.microsoft.com/office/drawing/2010/main"/>
+              </a:ext>
+            </a:extLst>
+          </a:blip>
+          <a:srcRect/>
+          <a:stretch>
+            <a:fillRect/>
+          </a:stretch>
+        </p:blipFill>
+        <p:spPr bwMode="auto">
+          <a:xfrm>
+            <a:off x="2222444" y="4357385"/>
+            <a:ext cx="501101" cy="580986"/>
+          </a:xfrm>
+          <a:prstGeom prst="rect">
+            <a:avLst/>
+          </a:prstGeom>
+          <a:noFill/>
+          <a:extLst>
+            <a:ext uri="{909E8E84-426E-40DD-AFC4-6F175D3DCCD1}">
+              <a14:hiddenFill xmlns:a14="http://schemas.microsoft.com/office/drawing/2010/main">
+                <a:solidFill>
+                  <a:srgbClr val="FFFFFF"/>
+                </a:solidFill>
+              </a14:hiddenFill>
+            </a:ext>
+          </a:extLst>
+        </p:spPr>
+      </p:pic>
+      <p:sp>
+        <p:nvSpPr>
+          <p:cNvPr id="64" name="角丸四角形 63"/>
+          <p:cNvSpPr/>
+          <p:nvPr/>
+        </p:nvSpPr>
+        <p:spPr>
+          <a:xfrm>
+            <a:off x="6830870" y="2082559"/>
+            <a:ext cx="931242" cy="479649"/>
+          </a:xfrm>
+          <a:prstGeom prst="roundRect">
+            <a:avLst/>
+          </a:prstGeom>
+          <a:solidFill>
+            <a:schemeClr val="bg1"/>
+          </a:solidFill>
+          <a:ln w="57150">
+            <a:solidFill>
+              <a:schemeClr val="bg1">
+                <a:lumMod val="75000"/>
+              </a:schemeClr>
+            </a:solidFill>
+          </a:ln>
+        </p:spPr>
+        <p:style>
+          <a:lnRef idx="2">
+            <a:schemeClr val="accent1">
+              <a:shade val="50000"/>
+            </a:schemeClr>
+          </a:lnRef>
+          <a:fillRef idx="1">
+            <a:schemeClr val="accent1"/>
+          </a:fillRef>
+          <a:effectRef idx="0">
+            <a:schemeClr val="accent1"/>
+          </a:effectRef>
+          <a:fontRef idx="minor">
+            <a:schemeClr val="lt1"/>
+          </a:fontRef>
+        </p:style>
+        <p:txBody>
+          <a:bodyPr rtlCol="0" anchor="ctr"/>
+          <a:lstStyle/>
+          <a:p>
+            <a:pPr algn="ctr"/>
+            <a:endParaRPr kumimoji="1" lang="ja-JP" altLang="en-US"/>
+          </a:p>
+        </p:txBody>
+      </p:sp>
+      <p:sp>
+        <p:nvSpPr>
+          <p:cNvPr id="65" name="テキスト ボックス 64"/>
+          <p:cNvSpPr txBox="1"/>
+          <p:nvPr/>
+        </p:nvSpPr>
+        <p:spPr>
+          <a:xfrm>
+            <a:off x="6879667" y="2094426"/>
+            <a:ext cx="822213" cy="430887"/>
+          </a:xfrm>
+          <a:prstGeom prst="rect">
+            <a:avLst/>
+          </a:prstGeom>
+          <a:noFill/>
+        </p:spPr>
+        <p:txBody>
+          <a:bodyPr wrap="none" lIns="0" tIns="0" rIns="0" bIns="0" rtlCol="0">
+            <a:spAutoFit/>
+          </a:bodyPr>
+          <a:lstStyle/>
+          <a:p>
+            <a:r>
+              <a:rPr lang="en-US" altLang="ja-JP" sz="1400" dirty="0" smtClean="0"/>
+              <a:t>Remote</a:t>
+            </a:r>
+            <a:br>
+              <a:rPr lang="en-US" altLang="ja-JP" sz="1400" dirty="0" smtClean="0"/>
+            </a:br>
+            <a:r>
+              <a:rPr lang="en-US" altLang="ja-JP" sz="1400" dirty="0" smtClean="0"/>
+              <a:t>Monitoring</a:t>
+            </a:r>
+            <a:endParaRPr kumimoji="1" lang="ja-JP" altLang="en-US" sz="1400" dirty="0"/>
+          </a:p>
+        </p:txBody>
+      </p:sp>
+      <p:sp>
+        <p:nvSpPr>
+          <p:cNvPr id="66" name="正方形/長方形 65"/>
+          <p:cNvSpPr/>
+          <p:nvPr/>
+        </p:nvSpPr>
+        <p:spPr>
+          <a:xfrm rot="2728749">
+            <a:off x="6230381" y="1937766"/>
+            <a:ext cx="687019" cy="45719"/>
+          </a:xfrm>
+          <a:prstGeom prst="rect">
+            <a:avLst/>
+          </a:prstGeom>
+          <a:solidFill>
+            <a:schemeClr val="bg1">
+              <a:lumMod val="75000"/>
+            </a:schemeClr>
+          </a:solidFill>
+          <a:ln>
+            <a:solidFill>
+              <a:schemeClr val="bg1">
+                <a:lumMod val="75000"/>
+              </a:schemeClr>
+            </a:solidFill>
+          </a:ln>
+        </p:spPr>
+        <p:style>
+          <a:lnRef idx="2">
+            <a:schemeClr val="accent1">
+              <a:shade val="50000"/>
+            </a:schemeClr>
+          </a:lnRef>
+          <a:fillRef idx="1">
+            <a:schemeClr val="accent1"/>
+          </a:fillRef>
+          <a:effectRef idx="0">
+            <a:schemeClr val="accent1"/>
+          </a:effectRef>
+          <a:fontRef idx="minor">
+            <a:schemeClr val="lt1"/>
+          </a:fontRef>
+        </p:style>
+        <p:txBody>
+          <a:bodyPr rtlCol="0" anchor="ctr"/>
+          <a:lstStyle/>
+          <a:p>
+            <a:pPr algn="ctr"/>
+            <a:endParaRPr kumimoji="1" lang="ja-JP" altLang="en-US"/>
+          </a:p>
+        </p:txBody>
+      </p:sp>
+      <p:pic>
+        <p:nvPicPr>
+          <p:cNvPr id="69" name="図 8"/>
+          <p:cNvPicPr>
+            <a:picLocks noChangeAspect="1"/>
+          </p:cNvPicPr>
+          <p:nvPr/>
+        </p:nvPicPr>
+        <p:blipFill>
+          <a:blip r:embed="rId12" cstate="print">
+            <a:extLst>
+              <a:ext uri="{28A0092B-C50C-407E-A947-70E740481C1C}">
+                <a14:useLocalDpi xmlns:a14="http://schemas.microsoft.com/office/drawing/2010/main"/>
+              </a:ext>
+            </a:extLst>
+          </a:blip>
+          <a:stretch>
+            <a:fillRect/>
+          </a:stretch>
+        </p:blipFill>
+        <p:spPr>
+          <a:xfrm>
+            <a:off x="7999736" y="1256000"/>
+            <a:ext cx="413874" cy="603217"/>
+          </a:xfrm>
+          <a:prstGeom prst="rect">
+            <a:avLst/>
+          </a:prstGeom>
+        </p:spPr>
+      </p:pic>
+      <p:sp>
+        <p:nvSpPr>
+          <p:cNvPr id="70" name="正方形/長方形 69"/>
+          <p:cNvSpPr/>
+          <p:nvPr/>
+        </p:nvSpPr>
+        <p:spPr>
+          <a:xfrm rot="16200000">
+            <a:off x="3810183" y="2270417"/>
+            <a:ext cx="752890" cy="45719"/>
+          </a:xfrm>
+          <a:prstGeom prst="rect">
+            <a:avLst/>
+          </a:prstGeom>
+          <a:solidFill>
+            <a:schemeClr val="bg1">
+              <a:lumMod val="75000"/>
+            </a:schemeClr>
+          </a:solidFill>
+          <a:ln>
+            <a:solidFill>
+              <a:schemeClr val="bg1">
+                <a:lumMod val="75000"/>
+              </a:schemeClr>
+            </a:solidFill>
+          </a:ln>
+        </p:spPr>
+        <p:style>
+          <a:lnRef idx="2">
+            <a:schemeClr val="accent1">
+              <a:shade val="50000"/>
+            </a:schemeClr>
+          </a:lnRef>
+          <a:fillRef idx="1">
+            <a:schemeClr val="accent1"/>
+          </a:fillRef>
+          <a:effectRef idx="0">
+            <a:schemeClr val="accent1"/>
+          </a:effectRef>
+          <a:fontRef idx="minor">
+            <a:schemeClr val="lt1"/>
+          </a:fontRef>
+        </p:style>
+        <p:txBody>
+          <a:bodyPr rtlCol="0" anchor="ctr"/>
+          <a:lstStyle/>
+          <a:p>
+            <a:pPr algn="ctr"/>
+            <a:endParaRPr kumimoji="1" lang="ja-JP" altLang="en-US"/>
+          </a:p>
+        </p:txBody>
+      </p:sp>
+      <p:pic>
+        <p:nvPicPr>
+          <p:cNvPr id="42" name="図 41"/>
+          <p:cNvPicPr>
+            <a:picLocks noChangeAspect="1"/>
+          </p:cNvPicPr>
+          <p:nvPr/>
+        </p:nvPicPr>
+        <p:blipFill>
+          <a:blip r:embed="rId3" cstate="print">
+            <a:extLst>
+              <a:ext uri="{28A0092B-C50C-407E-A947-70E740481C1C}">
+                <a14:useLocalDpi xmlns:a14="http://schemas.microsoft.com/office/drawing/2010/main"/>
+              </a:ext>
+            </a:extLst>
+          </a:blip>
+          <a:stretch>
+            <a:fillRect/>
+          </a:stretch>
+        </p:blipFill>
+        <p:spPr>
+          <a:xfrm>
+            <a:off x="4069115" y="1323380"/>
+            <a:ext cx="445173" cy="637976"/>
+          </a:xfrm>
+          <a:prstGeom prst="rect">
+            <a:avLst/>
+          </a:prstGeom>
+        </p:spPr>
+      </p:pic>
+      <p:pic>
+        <p:nvPicPr>
+          <p:cNvPr id="5" name="Picture 2" descr="ã½ã¼ã©ã¼ããã«ã®ã¤ã©ã¹ã"/>
+          <p:cNvPicPr>
+            <a:picLocks noChangeAspect="1" noChangeArrowheads="1"/>
+          </p:cNvPicPr>
+          <p:nvPr/>
+        </p:nvPicPr>
+        <p:blipFill>
+          <a:blip r:embed="rId13" cstate="print">
+            <a:extLst>
+              <a:ext uri="{28A0092B-C50C-407E-A947-70E740481C1C}">
+                <a14:useLocalDpi xmlns:a14="http://schemas.microsoft.com/office/drawing/2010/main" val="0"/>
+              </a:ext>
+            </a:extLst>
+          </a:blip>
+          <a:srcRect/>
+          <a:stretch>
+            <a:fillRect/>
+          </a:stretch>
+        </p:blipFill>
+        <p:spPr bwMode="auto">
+          <a:xfrm>
+            <a:off x="2614800" y="2982341"/>
+            <a:ext cx="877080" cy="662683"/>
+          </a:xfrm>
+          <a:prstGeom prst="rect">
+            <a:avLst/>
+          </a:prstGeom>
+          <a:noFill/>
+          <a:extLst>
+            <a:ext uri="{909E8E84-426E-40DD-AFC4-6F175D3DCCD1}">
+              <a14:hiddenFill xmlns:a14="http://schemas.microsoft.com/office/drawing/2010/main">
+                <a:solidFill>
+                  <a:srgbClr val="FFFFFF"/>
+                </a:solidFill>
+              </a14:hiddenFill>
+            </a:ext>
+          </a:extLst>
+        </p:spPr>
+      </p:pic>
+    </p:spTree>
+    <p:extLst>
+      <p:ext uri="{BB962C8B-B14F-4D97-AF65-F5344CB8AC3E}">
+        <p14:creationId xmlns:p14="http://schemas.microsoft.com/office/powerpoint/2010/main" val="3734219841"/>
+      </p:ext>
+    </p:extLst>
+  </p:cSld>
+  <p:clrMapOvr>
+    <a:masterClrMapping/>
+  </p:clrMapOvr>
+</p:sld>
+</file>
+
+<file path=ppt/slides/slide13.xml><?xml version="1.0" encoding="utf-8"?>
+<p:sld xmlns:a="http://schemas.openxmlformats.org/drawingml/2006/main" xmlns:r="http://schemas.openxmlformats.org/officeDocument/2006/relationships" xmlns:p="http://schemas.openxmlformats.org/presentationml/2006/main">
+  <p:cSld>
+    <p:spTree>
+      <p:nvGrpSpPr>
+        <p:cNvPr id="1" name=""/>
+        <p:cNvGrpSpPr/>
+        <p:nvPr/>
+      </p:nvGrpSpPr>
+      <p:grpSpPr>
+        <a:xfrm>
+          <a:off x="0" y="0"/>
+          <a:ext cx="0" cy="0"/>
+          <a:chOff x="0" y="0"/>
+          <a:chExt cx="0" cy="0"/>
+        </a:xfrm>
+      </p:grpSpPr>
+      <p:sp>
+        <p:nvSpPr>
+          <p:cNvPr id="28" name="角丸四角形 27"/>
+          <p:cNvSpPr/>
+          <p:nvPr/>
+        </p:nvSpPr>
+        <p:spPr>
+          <a:xfrm>
+            <a:off x="993732" y="2405641"/>
+            <a:ext cx="4370356" cy="3015044"/>
+          </a:xfrm>
+          <a:prstGeom prst="roundRect">
+            <a:avLst/>
+          </a:prstGeom>
+          <a:solidFill>
+            <a:schemeClr val="bg1"/>
+          </a:solidFill>
+          <a:ln w="57150">
+            <a:solidFill>
+              <a:schemeClr val="bg1">
+                <a:lumMod val="75000"/>
+              </a:schemeClr>
+            </a:solidFill>
+          </a:ln>
+        </p:spPr>
+        <p:style>
+          <a:lnRef idx="2">
+            <a:schemeClr val="accent1">
+              <a:shade val="50000"/>
+            </a:schemeClr>
+          </a:lnRef>
+          <a:fillRef idx="1">
+            <a:schemeClr val="accent1"/>
+          </a:fillRef>
+          <a:effectRef idx="0">
+            <a:schemeClr val="accent1"/>
+          </a:effectRef>
+          <a:fontRef idx="minor">
+            <a:schemeClr val="lt1"/>
+          </a:fontRef>
+        </p:style>
+        <p:txBody>
+          <a:bodyPr rtlCol="0" anchor="ctr"/>
+          <a:lstStyle/>
+          <a:p>
+            <a:pPr algn="ctr"/>
+            <a:endParaRPr kumimoji="1" lang="ja-JP" altLang="en-US"/>
+          </a:p>
+        </p:txBody>
+      </p:sp>
+      <p:sp>
+        <p:nvSpPr>
+          <p:cNvPr id="12" name="テキスト ボックス 11"/>
+          <p:cNvSpPr txBox="1"/>
+          <p:nvPr/>
+        </p:nvSpPr>
+        <p:spPr>
+          <a:xfrm>
+            <a:off x="3607914" y="4585412"/>
+            <a:ext cx="1105880" cy="369332"/>
+          </a:xfrm>
+          <a:prstGeom prst="rect">
+            <a:avLst/>
+          </a:prstGeom>
+          <a:noFill/>
+        </p:spPr>
+        <p:txBody>
+          <a:bodyPr wrap="none" rtlCol="0">
+            <a:spAutoFit/>
+          </a:bodyPr>
+          <a:lstStyle/>
+          <a:p>
+            <a:r>
+              <a:rPr kumimoji="1" lang="en-US" altLang="ja-JP" dirty="0" err="1"/>
+              <a:t>EtherCAT</a:t>
+            </a:r>
+            <a:endParaRPr kumimoji="1" lang="ja-JP" altLang="en-US" dirty="0"/>
+          </a:p>
+        </p:txBody>
+      </p:sp>
+      <p:sp>
+        <p:nvSpPr>
+          <p:cNvPr id="18" name="正方形/長方形 17"/>
+          <p:cNvSpPr/>
+          <p:nvPr/>
+        </p:nvSpPr>
+        <p:spPr>
+          <a:xfrm>
+            <a:off x="2935434" y="4911320"/>
+            <a:ext cx="440003" cy="49966"/>
+          </a:xfrm>
+          <a:prstGeom prst="rect">
+            <a:avLst/>
+          </a:prstGeom>
+          <a:solidFill>
+            <a:schemeClr val="bg1">
+              <a:lumMod val="75000"/>
+            </a:schemeClr>
+          </a:solidFill>
+          <a:ln>
+            <a:solidFill>
+              <a:schemeClr val="bg1">
+                <a:lumMod val="75000"/>
+              </a:schemeClr>
+            </a:solidFill>
+          </a:ln>
+        </p:spPr>
+        <p:style>
+          <a:lnRef idx="2">
+            <a:schemeClr val="accent1">
+              <a:shade val="50000"/>
+            </a:schemeClr>
+          </a:lnRef>
+          <a:fillRef idx="1">
+            <a:schemeClr val="accent1"/>
+          </a:fillRef>
+          <a:effectRef idx="0">
+            <a:schemeClr val="accent1"/>
+          </a:effectRef>
+          <a:fontRef idx="minor">
+            <a:schemeClr val="lt1"/>
+          </a:fontRef>
+        </p:style>
+        <p:txBody>
+          <a:bodyPr rtlCol="0" anchor="ctr"/>
+          <a:lstStyle/>
+          <a:p>
+            <a:pPr algn="ctr"/>
+            <a:endParaRPr kumimoji="1" lang="ja-JP" altLang="en-US"/>
+          </a:p>
+        </p:txBody>
+      </p:sp>
+      <p:sp>
+        <p:nvSpPr>
+          <p:cNvPr id="39" name="正方形/長方形 38"/>
+          <p:cNvSpPr/>
+          <p:nvPr/>
+        </p:nvSpPr>
+        <p:spPr>
+          <a:xfrm>
+            <a:off x="3684991" y="4911320"/>
+            <a:ext cx="1004788" cy="50830"/>
+          </a:xfrm>
+          <a:prstGeom prst="rect">
+            <a:avLst/>
+          </a:prstGeom>
+          <a:solidFill>
+            <a:schemeClr val="bg1">
+              <a:lumMod val="75000"/>
+            </a:schemeClr>
+          </a:solidFill>
+          <a:ln>
+            <a:solidFill>
+              <a:schemeClr val="bg1">
+                <a:lumMod val="75000"/>
+              </a:schemeClr>
+            </a:solidFill>
+          </a:ln>
+        </p:spPr>
+        <p:style>
+          <a:lnRef idx="2">
+            <a:schemeClr val="accent1">
+              <a:shade val="50000"/>
+            </a:schemeClr>
+          </a:lnRef>
+          <a:fillRef idx="1">
+            <a:schemeClr val="accent1"/>
+          </a:fillRef>
+          <a:effectRef idx="0">
+            <a:schemeClr val="accent1"/>
+          </a:effectRef>
+          <a:fontRef idx="minor">
+            <a:schemeClr val="lt1"/>
+          </a:fontRef>
+        </p:style>
+        <p:txBody>
+          <a:bodyPr rtlCol="0" anchor="ctr"/>
+          <a:lstStyle/>
+          <a:p>
+            <a:pPr algn="ctr"/>
+            <a:endParaRPr kumimoji="1" lang="ja-JP" altLang="en-US"/>
+          </a:p>
+        </p:txBody>
+      </p:sp>
+      <p:pic>
+        <p:nvPicPr>
+          <p:cNvPr id="1030" name="Picture 6" descr="C:\Users\knimura\AppData\Local\Microsoft\Windows\Temporary Internet Files\Content.IE5\3RQATYFN\lgi01a201408130500[1].jpg"/>
+          <p:cNvPicPr>
+            <a:picLocks noChangeAspect="1" noChangeArrowheads="1"/>
+          </p:cNvPicPr>
+          <p:nvPr/>
+        </p:nvPicPr>
+        <p:blipFill>
+          <a:blip r:embed="rId2" cstate="print">
+            <a:extLst>
+              <a:ext uri="{28A0092B-C50C-407E-A947-70E740481C1C}">
+                <a14:useLocalDpi xmlns:a14="http://schemas.microsoft.com/office/drawing/2010/main" val="0"/>
+              </a:ext>
+            </a:extLst>
+          </a:blip>
+          <a:srcRect/>
+          <a:stretch>
+            <a:fillRect/>
+          </a:stretch>
+        </p:blipFill>
+        <p:spPr bwMode="auto">
+          <a:xfrm>
+            <a:off x="2467756" y="3805637"/>
+            <a:ext cx="609629" cy="609629"/>
+          </a:xfrm>
+          <a:prstGeom prst="rect">
+            <a:avLst/>
+          </a:prstGeom>
+          <a:noFill/>
+          <a:extLst>
+            <a:ext uri="{909E8E84-426E-40DD-AFC4-6F175D3DCCD1}">
+              <a14:hiddenFill xmlns:a14="http://schemas.microsoft.com/office/drawing/2010/main">
+                <a:solidFill>
+                  <a:srgbClr val="FFFFFF"/>
+                </a:solidFill>
+              </a14:hiddenFill>
+            </a:ext>
+          </a:extLst>
+        </p:spPr>
+      </p:pic>
+      <p:pic>
+        <p:nvPicPr>
+          <p:cNvPr id="43" name="Picture 6" descr="C:\Users\knimura\AppData\Local\Microsoft\Windows\Temporary Internet Files\Content.IE5\3RQATYFN\lgi01a201408130500[1].jpg"/>
+          <p:cNvPicPr>
+            <a:picLocks noChangeAspect="1" noChangeArrowheads="1"/>
+          </p:cNvPicPr>
+          <p:nvPr/>
+        </p:nvPicPr>
+        <p:blipFill>
+          <a:blip r:embed="rId2" cstate="print">
+            <a:extLst>
+              <a:ext uri="{28A0092B-C50C-407E-A947-70E740481C1C}">
+                <a14:useLocalDpi xmlns:a14="http://schemas.microsoft.com/office/drawing/2010/main" val="0"/>
+              </a:ext>
+            </a:extLst>
+          </a:blip>
+          <a:srcRect/>
+          <a:stretch>
+            <a:fillRect/>
+          </a:stretch>
+        </p:blipFill>
+        <p:spPr bwMode="auto">
+          <a:xfrm>
+            <a:off x="3260898" y="3801102"/>
+            <a:ext cx="609629" cy="609629"/>
+          </a:xfrm>
+          <a:prstGeom prst="rect">
+            <a:avLst/>
+          </a:prstGeom>
+          <a:noFill/>
+          <a:extLst>
+            <a:ext uri="{909E8E84-426E-40DD-AFC4-6F175D3DCCD1}">
+              <a14:hiddenFill xmlns:a14="http://schemas.microsoft.com/office/drawing/2010/main">
+                <a:solidFill>
+                  <a:srgbClr val="FFFFFF"/>
+                </a:solidFill>
+              </a14:hiddenFill>
+            </a:ext>
+          </a:extLst>
+        </p:spPr>
+      </p:pic>
+      <p:sp>
+        <p:nvSpPr>
+          <p:cNvPr id="53" name="正方形/長方形 52"/>
+          <p:cNvSpPr/>
+          <p:nvPr/>
+        </p:nvSpPr>
+        <p:spPr>
+          <a:xfrm>
+            <a:off x="2699792" y="3573696"/>
+            <a:ext cx="440003" cy="49966"/>
+          </a:xfrm>
+          <a:prstGeom prst="rect">
+            <a:avLst/>
+          </a:prstGeom>
+          <a:solidFill>
+            <a:schemeClr val="bg1">
+              <a:lumMod val="75000"/>
+            </a:schemeClr>
+          </a:solidFill>
+          <a:ln>
+            <a:solidFill>
+              <a:schemeClr val="bg1">
+                <a:lumMod val="75000"/>
+              </a:schemeClr>
+            </a:solidFill>
+          </a:ln>
+        </p:spPr>
+        <p:style>
+          <a:lnRef idx="2">
+            <a:schemeClr val="accent1">
+              <a:shade val="50000"/>
+            </a:schemeClr>
+          </a:lnRef>
+          <a:fillRef idx="1">
+            <a:schemeClr val="accent1"/>
+          </a:fillRef>
+          <a:effectRef idx="0">
+            <a:schemeClr val="accent1"/>
+          </a:effectRef>
+          <a:fontRef idx="minor">
+            <a:schemeClr val="lt1"/>
+          </a:fontRef>
+        </p:style>
+        <p:txBody>
+          <a:bodyPr rtlCol="0" anchor="ctr"/>
+          <a:lstStyle/>
+          <a:p>
+            <a:pPr algn="ctr"/>
+            <a:endParaRPr kumimoji="1" lang="ja-JP" altLang="en-US"/>
+          </a:p>
+        </p:txBody>
+      </p:sp>
+      <p:sp>
+        <p:nvSpPr>
+          <p:cNvPr id="55" name="正方形/長方形 54"/>
+          <p:cNvSpPr/>
+          <p:nvPr/>
+        </p:nvSpPr>
+        <p:spPr>
+          <a:xfrm>
+            <a:off x="3347864" y="3574560"/>
+            <a:ext cx="890859" cy="49966"/>
+          </a:xfrm>
+          <a:prstGeom prst="rect">
+            <a:avLst/>
+          </a:prstGeom>
+          <a:solidFill>
+            <a:schemeClr val="bg1">
+              <a:lumMod val="75000"/>
+            </a:schemeClr>
+          </a:solidFill>
+          <a:ln>
+            <a:solidFill>
+              <a:schemeClr val="bg1">
+                <a:lumMod val="75000"/>
+              </a:schemeClr>
+            </a:solidFill>
+          </a:ln>
+        </p:spPr>
+        <p:style>
+          <a:lnRef idx="2">
+            <a:schemeClr val="accent1">
+              <a:shade val="50000"/>
+            </a:schemeClr>
+          </a:lnRef>
+          <a:fillRef idx="1">
+            <a:schemeClr val="accent1"/>
+          </a:fillRef>
+          <a:effectRef idx="0">
+            <a:schemeClr val="accent1"/>
+          </a:effectRef>
+          <a:fontRef idx="minor">
+            <a:schemeClr val="lt1"/>
+          </a:fontRef>
+        </p:style>
+        <p:txBody>
+          <a:bodyPr rtlCol="0" anchor="ctr"/>
+          <a:lstStyle/>
+          <a:p>
+            <a:pPr algn="ctr"/>
+            <a:endParaRPr kumimoji="1" lang="ja-JP" altLang="en-US"/>
+          </a:p>
+        </p:txBody>
+      </p:sp>
+      <p:pic>
+        <p:nvPicPr>
+          <p:cNvPr id="56" name="Picture 6" descr="C:\Users\knimura\AppData\Local\Microsoft\Windows\Temporary Internet Files\Content.IE5\3RQATYFN\lgi01a201408130500[1].jpg"/>
+          <p:cNvPicPr>
+            <a:picLocks noChangeAspect="1" noChangeArrowheads="1"/>
+          </p:cNvPicPr>
+          <p:nvPr/>
+        </p:nvPicPr>
+        <p:blipFill>
+          <a:blip r:embed="rId2" cstate="print">
+            <a:extLst>
+              <a:ext uri="{28A0092B-C50C-407E-A947-70E740481C1C}">
+                <a14:useLocalDpi xmlns:a14="http://schemas.microsoft.com/office/drawing/2010/main" val="0"/>
+              </a:ext>
+            </a:extLst>
+          </a:blip>
+          <a:srcRect/>
+          <a:stretch>
+            <a:fillRect/>
+          </a:stretch>
+        </p:blipFill>
+        <p:spPr bwMode="auto">
+          <a:xfrm>
+            <a:off x="2195736" y="2468013"/>
+            <a:ext cx="609629" cy="609629"/>
+          </a:xfrm>
+          <a:prstGeom prst="rect">
+            <a:avLst/>
+          </a:prstGeom>
+          <a:noFill/>
+          <a:extLst>
+            <a:ext uri="{909E8E84-426E-40DD-AFC4-6F175D3DCCD1}">
+              <a14:hiddenFill xmlns:a14="http://schemas.microsoft.com/office/drawing/2010/main">
+                <a:solidFill>
+                  <a:srgbClr val="FFFFFF"/>
+                </a:solidFill>
+              </a14:hiddenFill>
+            </a:ext>
+          </a:extLst>
+        </p:spPr>
+      </p:pic>
+      <p:pic>
+        <p:nvPicPr>
+          <p:cNvPr id="57" name="Picture 6" descr="C:\Users\knimura\AppData\Local\Microsoft\Windows\Temporary Internet Files\Content.IE5\3RQATYFN\lgi01a201408130500[1].jpg"/>
+          <p:cNvPicPr>
+            <a:picLocks noChangeAspect="1" noChangeArrowheads="1"/>
+          </p:cNvPicPr>
+          <p:nvPr/>
+        </p:nvPicPr>
+        <p:blipFill>
+          <a:blip r:embed="rId2" cstate="print">
+            <a:extLst>
+              <a:ext uri="{28A0092B-C50C-407E-A947-70E740481C1C}">
+                <a14:useLocalDpi xmlns:a14="http://schemas.microsoft.com/office/drawing/2010/main" val="0"/>
+              </a:ext>
+            </a:extLst>
+          </a:blip>
+          <a:srcRect/>
+          <a:stretch>
+            <a:fillRect/>
+          </a:stretch>
+        </p:blipFill>
+        <p:spPr bwMode="auto">
+          <a:xfrm>
+            <a:off x="2949724" y="2463478"/>
+            <a:ext cx="609629" cy="609629"/>
+          </a:xfrm>
+          <a:prstGeom prst="rect">
+            <a:avLst/>
+          </a:prstGeom>
+          <a:noFill/>
+          <a:extLst>
+            <a:ext uri="{909E8E84-426E-40DD-AFC4-6F175D3DCCD1}">
+              <a14:hiddenFill xmlns:a14="http://schemas.microsoft.com/office/drawing/2010/main">
+                <a:solidFill>
+                  <a:srgbClr val="FFFFFF"/>
+                </a:solidFill>
+              </a14:hiddenFill>
+            </a:ext>
+          </a:extLst>
+        </p:spPr>
+      </p:pic>
+      <p:sp>
+        <p:nvSpPr>
+          <p:cNvPr id="58" name="テキスト ボックス 57"/>
+          <p:cNvSpPr txBox="1"/>
+          <p:nvPr/>
+        </p:nvSpPr>
+        <p:spPr>
+          <a:xfrm>
+            <a:off x="3284042" y="3264357"/>
+            <a:ext cx="914033" cy="369332"/>
+          </a:xfrm>
+          <a:prstGeom prst="rect">
+            <a:avLst/>
+          </a:prstGeom>
+          <a:noFill/>
+        </p:spPr>
+        <p:txBody>
+          <a:bodyPr wrap="none" rtlCol="0">
+            <a:spAutoFit/>
+          </a:bodyPr>
+          <a:lstStyle/>
+          <a:p>
+            <a:r>
+              <a:rPr kumimoji="1" lang="en-US" altLang="ja-JP" dirty="0"/>
+              <a:t>RS-485</a:t>
+            </a:r>
+            <a:endParaRPr kumimoji="1" lang="ja-JP" altLang="en-US" dirty="0"/>
+          </a:p>
+        </p:txBody>
+      </p:sp>
+      <p:sp>
+        <p:nvSpPr>
+          <p:cNvPr id="41" name="雲 40"/>
+          <p:cNvSpPr/>
+          <p:nvPr/>
+        </p:nvSpPr>
+        <p:spPr>
+          <a:xfrm>
+            <a:off x="3648305" y="1772816"/>
+            <a:ext cx="2880320" cy="1237712"/>
+          </a:xfrm>
+          <a:prstGeom prst="cloud">
+            <a:avLst/>
+          </a:prstGeom>
+          <a:solidFill>
+            <a:schemeClr val="bg1"/>
+          </a:solidFill>
+        </p:spPr>
+        <p:style>
+          <a:lnRef idx="2">
+            <a:schemeClr val="accent1">
+              <a:shade val="50000"/>
+            </a:schemeClr>
+          </a:lnRef>
+          <a:fillRef idx="1">
+            <a:schemeClr val="accent1"/>
+          </a:fillRef>
+          <a:effectRef idx="0">
+            <a:schemeClr val="accent1"/>
+          </a:effectRef>
+          <a:fontRef idx="minor">
+            <a:schemeClr val="lt1"/>
+          </a:fontRef>
+        </p:style>
+        <p:txBody>
+          <a:bodyPr rtlCol="0" anchor="ctr"/>
+          <a:lstStyle>
+            <a:defPPr>
+              <a:defRPr lang="ja-JP"/>
+            </a:defPPr>
+            <a:lvl1pPr marL="0" algn="l" defTabSz="914400" rtl="0" eaLnBrk="1" latinLnBrk="0" hangingPunct="1">
+              <a:defRPr kumimoji="1" sz="1800" kern="1200">
+                <a:solidFill>
+                  <a:schemeClr val="lt1"/>
+                </a:solidFill>
+                <a:latin typeface="+mn-lt"/>
+                <a:ea typeface="+mn-ea"/>
+                <a:cs typeface="+mn-cs"/>
+              </a:defRPr>
+            </a:lvl1pPr>
+            <a:lvl2pPr marL="457200" algn="l" defTabSz="914400" rtl="0" eaLnBrk="1" latinLnBrk="0" hangingPunct="1">
+              <a:defRPr kumimoji="1" sz="1800" kern="1200">
+                <a:solidFill>
+                  <a:schemeClr val="lt1"/>
+                </a:solidFill>
+                <a:latin typeface="+mn-lt"/>
+                <a:ea typeface="+mn-ea"/>
+                <a:cs typeface="+mn-cs"/>
+              </a:defRPr>
+            </a:lvl2pPr>
+            <a:lvl3pPr marL="914400" algn="l" defTabSz="914400" rtl="0" eaLnBrk="1" latinLnBrk="0" hangingPunct="1">
+              <a:defRPr kumimoji="1" sz="1800" kern="1200">
+                <a:solidFill>
+                  <a:schemeClr val="lt1"/>
+                </a:solidFill>
+                <a:latin typeface="+mn-lt"/>
+                <a:ea typeface="+mn-ea"/>
+                <a:cs typeface="+mn-cs"/>
+              </a:defRPr>
+            </a:lvl3pPr>
+            <a:lvl4pPr marL="1371600" algn="l" defTabSz="914400" rtl="0" eaLnBrk="1" latinLnBrk="0" hangingPunct="1">
+              <a:defRPr kumimoji="1" sz="1800" kern="1200">
+                <a:solidFill>
+                  <a:schemeClr val="lt1"/>
+                </a:solidFill>
+                <a:latin typeface="+mn-lt"/>
+                <a:ea typeface="+mn-ea"/>
+                <a:cs typeface="+mn-cs"/>
+              </a:defRPr>
+            </a:lvl4pPr>
+            <a:lvl5pPr marL="1828800" algn="l" defTabSz="914400" rtl="0" eaLnBrk="1" latinLnBrk="0" hangingPunct="1">
+              <a:defRPr kumimoji="1" sz="1800" kern="1200">
+                <a:solidFill>
+                  <a:schemeClr val="lt1"/>
+                </a:solidFill>
+                <a:latin typeface="+mn-lt"/>
+                <a:ea typeface="+mn-ea"/>
+                <a:cs typeface="+mn-cs"/>
+              </a:defRPr>
+            </a:lvl5pPr>
+            <a:lvl6pPr marL="2286000" algn="l" defTabSz="914400" rtl="0" eaLnBrk="1" latinLnBrk="0" hangingPunct="1">
+              <a:defRPr kumimoji="1" sz="1800" kern="1200">
+                <a:solidFill>
+                  <a:schemeClr val="lt1"/>
+                </a:solidFill>
+                <a:latin typeface="+mn-lt"/>
+                <a:ea typeface="+mn-ea"/>
+                <a:cs typeface="+mn-cs"/>
+              </a:defRPr>
+            </a:lvl6pPr>
+            <a:lvl7pPr marL="2743200" algn="l" defTabSz="914400" rtl="0" eaLnBrk="1" latinLnBrk="0" hangingPunct="1">
+              <a:defRPr kumimoji="1" sz="1800" kern="1200">
+                <a:solidFill>
+                  <a:schemeClr val="lt1"/>
+                </a:solidFill>
+                <a:latin typeface="+mn-lt"/>
+                <a:ea typeface="+mn-ea"/>
+                <a:cs typeface="+mn-cs"/>
+              </a:defRPr>
+            </a:lvl7pPr>
+            <a:lvl8pPr marL="3200400" algn="l" defTabSz="914400" rtl="0" eaLnBrk="1" latinLnBrk="0" hangingPunct="1">
+              <a:defRPr kumimoji="1" sz="1800" kern="1200">
+                <a:solidFill>
+                  <a:schemeClr val="lt1"/>
+                </a:solidFill>
+                <a:latin typeface="+mn-lt"/>
+                <a:ea typeface="+mn-ea"/>
+                <a:cs typeface="+mn-cs"/>
+              </a:defRPr>
+            </a:lvl8pPr>
+            <a:lvl9pPr marL="3657600" algn="l" defTabSz="914400" rtl="0" eaLnBrk="1" latinLnBrk="0" hangingPunct="1">
+              <a:defRPr kumimoji="1" sz="1800" kern="1200">
+                <a:solidFill>
+                  <a:schemeClr val="lt1"/>
+                </a:solidFill>
+                <a:latin typeface="+mn-lt"/>
+                <a:ea typeface="+mn-ea"/>
+                <a:cs typeface="+mn-cs"/>
+              </a:defRPr>
+            </a:lvl9pPr>
+          </a:lstStyle>
+          <a:p>
+            <a:pPr algn="ctr"/>
+            <a:endParaRPr kumimoji="1" lang="ja-JP" altLang="en-US"/>
+          </a:p>
+        </p:txBody>
+      </p:sp>
+      <p:pic>
+        <p:nvPicPr>
+          <p:cNvPr id="1033" name="Picture 9" descr="C:\Users\knimura\AppData\Local\Microsoft\Windows\Temporary Internet Files\Content.IE5\3QHSGS3E\xbox-on-pc[1].jpg"/>
+          <p:cNvPicPr>
+            <a:picLocks noChangeAspect="1" noChangeArrowheads="1"/>
+          </p:cNvPicPr>
+          <p:nvPr/>
+        </p:nvPicPr>
+        <p:blipFill>
           <a:blip r:embed="rId3" cstate="print">
             <a:extLst>
               <a:ext uri="{28A0092B-C50C-407E-A947-70E740481C1C}">
@@ -7847,7 +9450,7 @@
 </p:sld>
 </file>
 
-<file path=ppt/slides/slide13.xml><?xml version="1.0" encoding="utf-8"?>
+<file path=ppt/slides/slide14.xml><?xml version="1.0" encoding="utf-8"?>
 <p:sld xmlns:a="http://schemas.openxmlformats.org/drawingml/2006/main" xmlns:r="http://schemas.openxmlformats.org/officeDocument/2006/relationships" xmlns:p="http://schemas.openxmlformats.org/presentationml/2006/main">
   <p:cSld>
     <p:spTree>
@@ -9647,7 +11250,7 @@
           <p:cNvPr id="15" name="テキスト ボックス 18">
             <a:extLst>
               <a:ext uri="{FF2B5EF4-FFF2-40B4-BE49-F238E27FC236}">
-                <a16:creationId xmlns:a16="http://schemas.microsoft.com/office/drawing/2014/main" id="{BE9A932B-47DB-4B4F-90A6-3F236BA6C6D0}"/>
+                <a16:creationId xmlns="" xmlns:a16="http://schemas.microsoft.com/office/drawing/2014/main" id="{BE9A932B-47DB-4B4F-90A6-3F236BA6C6D0}"/>
               </a:ext>
             </a:extLst>
           </p:cNvPr>
@@ -10040,7 +11643,7 @@
           <p:cNvPr id="15" name="テキスト ボックス 18">
             <a:extLst>
               <a:ext uri="{FF2B5EF4-FFF2-40B4-BE49-F238E27FC236}">
-                <a16:creationId xmlns:a16="http://schemas.microsoft.com/office/drawing/2014/main" id="{5B9D17E8-173F-4B4C-963C-C646B80CF2E7}"/>
+                <a16:creationId xmlns="" xmlns:a16="http://schemas.microsoft.com/office/drawing/2014/main" id="{5B9D17E8-173F-4B4C-963C-C646B80CF2E7}"/>
               </a:ext>
             </a:extLst>
           </p:cNvPr>
@@ -10421,7 +12024,7 @@
           <p:cNvPr id="12" name="テキスト ボックス 18">
             <a:extLst>
               <a:ext uri="{FF2B5EF4-FFF2-40B4-BE49-F238E27FC236}">
-                <a16:creationId xmlns:a16="http://schemas.microsoft.com/office/drawing/2014/main" id="{A8D79E22-D110-A944-A474-A42156233C3E}"/>
+                <a16:creationId xmlns="" xmlns:a16="http://schemas.microsoft.com/office/drawing/2014/main" id="{A8D79E22-D110-A944-A474-A42156233C3E}"/>
               </a:ext>
             </a:extLst>
           </p:cNvPr>
@@ -10915,7 +12518,7 @@
           <p:cNvPr id="15" name="テキスト ボックス 18">
             <a:extLst>
               <a:ext uri="{FF2B5EF4-FFF2-40B4-BE49-F238E27FC236}">
-                <a16:creationId xmlns:a16="http://schemas.microsoft.com/office/drawing/2014/main" id="{AFE42B18-28B9-9245-A082-17E76DDF5446}"/>
+                <a16:creationId xmlns="" xmlns:a16="http://schemas.microsoft.com/office/drawing/2014/main" id="{AFE42B18-28B9-9245-A082-17E76DDF5446}"/>
               </a:ext>
             </a:extLst>
           </p:cNvPr>
@@ -11409,7 +13012,7 @@
           <p:cNvPr id="15" name="テキスト ボックス 18">
             <a:extLst>
               <a:ext uri="{FF2B5EF4-FFF2-40B4-BE49-F238E27FC236}">
-                <a16:creationId xmlns:a16="http://schemas.microsoft.com/office/drawing/2014/main" id="{AFE42B18-28B9-9245-A082-17E76DDF5446}"/>
+                <a16:creationId xmlns="" xmlns:a16="http://schemas.microsoft.com/office/drawing/2014/main" id="{AFE42B18-28B9-9245-A082-17E76DDF5446}"/>
               </a:ext>
             </a:extLst>
           </p:cNvPr>
@@ -11991,7 +13594,7 @@
           <p:cNvPr id="20" name="テキスト ボックス 18">
             <a:extLst>
               <a:ext uri="{FF2B5EF4-FFF2-40B4-BE49-F238E27FC236}">
-                <a16:creationId xmlns:a16="http://schemas.microsoft.com/office/drawing/2014/main" id="{1BABC55C-975E-6846-985C-88584B52D21F}"/>
+                <a16:creationId xmlns="" xmlns:a16="http://schemas.microsoft.com/office/drawing/2014/main" id="{1BABC55C-975E-6846-985C-88584B52D21F}"/>
               </a:ext>
             </a:extLst>
           </p:cNvPr>
@@ -12573,7 +14176,7 @@
           <p:cNvPr id="20" name="テキスト ボックス 18">
             <a:extLst>
               <a:ext uri="{FF2B5EF4-FFF2-40B4-BE49-F238E27FC236}">
-                <a16:creationId xmlns:a16="http://schemas.microsoft.com/office/drawing/2014/main" id="{1BABC55C-975E-6846-985C-88584B52D21F}"/>
+                <a16:creationId xmlns="" xmlns:a16="http://schemas.microsoft.com/office/drawing/2014/main" id="{1BABC55C-975E-6846-985C-88584B52D21F}"/>
               </a:ext>
             </a:extLst>
           </p:cNvPr>
@@ -12880,7 +14483,7 @@
           <p:cNvPr id="20" name="テキスト ボックス 18">
             <a:extLst>
               <a:ext uri="{FF2B5EF4-FFF2-40B4-BE49-F238E27FC236}">
-                <a16:creationId xmlns:a16="http://schemas.microsoft.com/office/drawing/2014/main" id="{1BABC55C-975E-6846-985C-88584B52D21F}"/>
+                <a16:creationId xmlns="" xmlns:a16="http://schemas.microsoft.com/office/drawing/2014/main" id="{1BABC55C-975E-6846-985C-88584B52D21F}"/>
               </a:ext>
             </a:extLst>
           </p:cNvPr>
@@ -12917,7 +14520,7 @@
           <p:cNvPr id="3" name="Oval 2">
             <a:extLst>
               <a:ext uri="{FF2B5EF4-FFF2-40B4-BE49-F238E27FC236}">
-                <a16:creationId xmlns:a16="http://schemas.microsoft.com/office/drawing/2014/main" id="{F23D0E80-999F-1541-A5F6-6BBF0C95A4C5}"/>
+                <a16:creationId xmlns="" xmlns:a16="http://schemas.microsoft.com/office/drawing/2014/main" id="{F23D0E80-999F-1541-A5F6-6BBF0C95A4C5}"/>
               </a:ext>
             </a:extLst>
           </p:cNvPr>
@@ -12963,7 +14566,7 @@
           <p:cNvPr id="25" name="Oval 24">
             <a:extLst>
               <a:ext uri="{FF2B5EF4-FFF2-40B4-BE49-F238E27FC236}">
-                <a16:creationId xmlns:a16="http://schemas.microsoft.com/office/drawing/2014/main" id="{3D400183-EBD7-8543-BD63-433B580A26EB}"/>
+                <a16:creationId xmlns="" xmlns:a16="http://schemas.microsoft.com/office/drawing/2014/main" id="{3D400183-EBD7-8543-BD63-433B580A26EB}"/>
               </a:ext>
             </a:extLst>
           </p:cNvPr>
@@ -13009,7 +14612,7 @@
           <p:cNvPr id="28" name="Oval 27">
             <a:extLst>
               <a:ext uri="{FF2B5EF4-FFF2-40B4-BE49-F238E27FC236}">
-                <a16:creationId xmlns:a16="http://schemas.microsoft.com/office/drawing/2014/main" id="{D2E8EC0D-77EA-EF45-888C-45592064E80E}"/>
+                <a16:creationId xmlns="" xmlns:a16="http://schemas.microsoft.com/office/drawing/2014/main" id="{D2E8EC0D-77EA-EF45-888C-45592064E80E}"/>
               </a:ext>
             </a:extLst>
           </p:cNvPr>
@@ -13055,7 +14658,7 @@
           <p:cNvPr id="29" name="Oval 28">
             <a:extLst>
               <a:ext uri="{FF2B5EF4-FFF2-40B4-BE49-F238E27FC236}">
-                <a16:creationId xmlns:a16="http://schemas.microsoft.com/office/drawing/2014/main" id="{FAAC52EC-CA61-844C-BFEC-FD01C27DCB59}"/>
+                <a16:creationId xmlns="" xmlns:a16="http://schemas.microsoft.com/office/drawing/2014/main" id="{FAAC52EC-CA61-844C-BFEC-FD01C27DCB59}"/>
               </a:ext>
             </a:extLst>
           </p:cNvPr>
@@ -13101,7 +14704,7 @@
           <p:cNvPr id="30" name="Oval 29">
             <a:extLst>
               <a:ext uri="{FF2B5EF4-FFF2-40B4-BE49-F238E27FC236}">
-                <a16:creationId xmlns:a16="http://schemas.microsoft.com/office/drawing/2014/main" id="{E1B6F3D0-C69A-5A4C-BA4C-AC839758A2C7}"/>
+                <a16:creationId xmlns="" xmlns:a16="http://schemas.microsoft.com/office/drawing/2014/main" id="{E1B6F3D0-C69A-5A4C-BA4C-AC839758A2C7}"/>
               </a:ext>
             </a:extLst>
           </p:cNvPr>
@@ -13147,7 +14750,7 @@
           <p:cNvPr id="5" name="Straight Connector 4">
             <a:extLst>
               <a:ext uri="{FF2B5EF4-FFF2-40B4-BE49-F238E27FC236}">
-                <a16:creationId xmlns:a16="http://schemas.microsoft.com/office/drawing/2014/main" id="{BE538986-3A1C-E34A-9C72-DC4DEEB9D1FC}"/>
+                <a16:creationId xmlns="" xmlns:a16="http://schemas.microsoft.com/office/drawing/2014/main" id="{BE538986-3A1C-E34A-9C72-DC4DEEB9D1FC}"/>
               </a:ext>
             </a:extLst>
           </p:cNvPr>
@@ -13187,7 +14790,7 @@
           <p:cNvPr id="9" name="Straight Connector 8">
             <a:extLst>
               <a:ext uri="{FF2B5EF4-FFF2-40B4-BE49-F238E27FC236}">
-                <a16:creationId xmlns:a16="http://schemas.microsoft.com/office/drawing/2014/main" id="{BD5BF377-A61B-6F40-BC3D-41BA7E5C3680}"/>
+                <a16:creationId xmlns="" xmlns:a16="http://schemas.microsoft.com/office/drawing/2014/main" id="{BD5BF377-A61B-6F40-BC3D-41BA7E5C3680}"/>
               </a:ext>
             </a:extLst>
           </p:cNvPr>
@@ -13226,7 +14829,7 @@
           <p:cNvPr id="12" name="Straight Connector 11">
             <a:extLst>
               <a:ext uri="{FF2B5EF4-FFF2-40B4-BE49-F238E27FC236}">
-                <a16:creationId xmlns:a16="http://schemas.microsoft.com/office/drawing/2014/main" id="{931CAE2B-3739-E749-AFC3-8FF0F5318057}"/>
+                <a16:creationId xmlns="" xmlns:a16="http://schemas.microsoft.com/office/drawing/2014/main" id="{931CAE2B-3739-E749-AFC3-8FF0F5318057}"/>
               </a:ext>
             </a:extLst>
           </p:cNvPr>
@@ -13266,7 +14869,7 @@
           <p:cNvPr id="33" name="Straight Connector 32">
             <a:extLst>
               <a:ext uri="{FF2B5EF4-FFF2-40B4-BE49-F238E27FC236}">
-                <a16:creationId xmlns:a16="http://schemas.microsoft.com/office/drawing/2014/main" id="{575FB9A1-2A60-0440-87E9-9EF358ED596C}"/>
+                <a16:creationId xmlns="" xmlns:a16="http://schemas.microsoft.com/office/drawing/2014/main" id="{575FB9A1-2A60-0440-87E9-9EF358ED596C}"/>
               </a:ext>
             </a:extLst>
           </p:cNvPr>
@@ -13305,7 +14908,7 @@
           <p:cNvPr id="35" name="Straight Connector 34">
             <a:extLst>
               <a:ext uri="{FF2B5EF4-FFF2-40B4-BE49-F238E27FC236}">
-                <a16:creationId xmlns:a16="http://schemas.microsoft.com/office/drawing/2014/main" id="{88A1850E-CD69-1649-A05E-8AFBAA505FD7}"/>
+                <a16:creationId xmlns="" xmlns:a16="http://schemas.microsoft.com/office/drawing/2014/main" id="{88A1850E-CD69-1649-A05E-8AFBAA505FD7}"/>
               </a:ext>
             </a:extLst>
           </p:cNvPr>
@@ -13344,7 +14947,7 @@
           <p:cNvPr id="40" name="Straight Connector 39">
             <a:extLst>
               <a:ext uri="{FF2B5EF4-FFF2-40B4-BE49-F238E27FC236}">
-                <a16:creationId xmlns:a16="http://schemas.microsoft.com/office/drawing/2014/main" id="{85936ABA-53DB-7541-A3A9-B326378109BB}"/>
+                <a16:creationId xmlns="" xmlns:a16="http://schemas.microsoft.com/office/drawing/2014/main" id="{85936ABA-53DB-7541-A3A9-B326378109BB}"/>
               </a:ext>
             </a:extLst>
           </p:cNvPr>
@@ -13383,7 +14986,7 @@
           <p:cNvPr id="42" name="直線矢印コネクタ 17">
             <a:extLst>
               <a:ext uri="{FF2B5EF4-FFF2-40B4-BE49-F238E27FC236}">
-                <a16:creationId xmlns:a16="http://schemas.microsoft.com/office/drawing/2014/main" id="{B5342E1A-177F-CD4A-95C3-440FC11D1ADA}"/>
+                <a16:creationId xmlns="" xmlns:a16="http://schemas.microsoft.com/office/drawing/2014/main" id="{B5342E1A-177F-CD4A-95C3-440FC11D1ADA}"/>
               </a:ext>
             </a:extLst>
           </p:cNvPr>
@@ -13472,7 +15075,7 @@
           <p:cNvPr id="57" name="正方形/長方形 17">
             <a:extLst>
               <a:ext uri="{FF2B5EF4-FFF2-40B4-BE49-F238E27FC236}">
-                <a16:creationId xmlns:a16="http://schemas.microsoft.com/office/drawing/2014/main" id="{130B3935-1247-3348-8096-94B45ADA2C4F}"/>
+                <a16:creationId xmlns="" xmlns:a16="http://schemas.microsoft.com/office/drawing/2014/main" id="{130B3935-1247-3348-8096-94B45ADA2C4F}"/>
               </a:ext>
             </a:extLst>
           </p:cNvPr>
@@ -13580,7 +15183,7 @@
           <p:cNvPr id="58" name="Group 57">
             <a:extLst>
               <a:ext uri="{FF2B5EF4-FFF2-40B4-BE49-F238E27FC236}">
-                <a16:creationId xmlns:a16="http://schemas.microsoft.com/office/drawing/2014/main" id="{1122A44C-DC11-CA43-AAB9-934279EF613C}"/>
+                <a16:creationId xmlns="" xmlns:a16="http://schemas.microsoft.com/office/drawing/2014/main" id="{1122A44C-DC11-CA43-AAB9-934279EF613C}"/>
               </a:ext>
             </a:extLst>
           </p:cNvPr>
@@ -13600,7 +15203,7 @@
             <p:cNvPr id="59" name="Oval 58">
               <a:extLst>
                 <a:ext uri="{FF2B5EF4-FFF2-40B4-BE49-F238E27FC236}">
-                  <a16:creationId xmlns:a16="http://schemas.microsoft.com/office/drawing/2014/main" id="{1AC815EF-350D-6F45-BCCD-E2241D4A81AE}"/>
+                  <a16:creationId xmlns="" xmlns:a16="http://schemas.microsoft.com/office/drawing/2014/main" id="{1AC815EF-350D-6F45-BCCD-E2241D4A81AE}"/>
                 </a:ext>
               </a:extLst>
             </p:cNvPr>
@@ -13646,7 +15249,7 @@
             <p:cNvPr id="60" name="Oval 59">
               <a:extLst>
                 <a:ext uri="{FF2B5EF4-FFF2-40B4-BE49-F238E27FC236}">
-                  <a16:creationId xmlns:a16="http://schemas.microsoft.com/office/drawing/2014/main" id="{688CB2FF-E17D-6B45-A615-DD1CE4CF8524}"/>
+                  <a16:creationId xmlns="" xmlns:a16="http://schemas.microsoft.com/office/drawing/2014/main" id="{688CB2FF-E17D-6B45-A615-DD1CE4CF8524}"/>
                 </a:ext>
               </a:extLst>
             </p:cNvPr>
@@ -13692,7 +15295,7 @@
             <p:cNvPr id="61" name="Oval 60">
               <a:extLst>
                 <a:ext uri="{FF2B5EF4-FFF2-40B4-BE49-F238E27FC236}">
-                  <a16:creationId xmlns:a16="http://schemas.microsoft.com/office/drawing/2014/main" id="{26E520C9-124A-AB42-AC17-4C557C0B1892}"/>
+                  <a16:creationId xmlns="" xmlns:a16="http://schemas.microsoft.com/office/drawing/2014/main" id="{26E520C9-124A-AB42-AC17-4C557C0B1892}"/>
                 </a:ext>
               </a:extLst>
             </p:cNvPr>
@@ -13738,7 +15341,7 @@
             <p:cNvPr id="62" name="Oval 61">
               <a:extLst>
                 <a:ext uri="{FF2B5EF4-FFF2-40B4-BE49-F238E27FC236}">
-                  <a16:creationId xmlns:a16="http://schemas.microsoft.com/office/drawing/2014/main" id="{D5129498-28A3-D649-B52F-8D571E7DC550}"/>
+                  <a16:creationId xmlns="" xmlns:a16="http://schemas.microsoft.com/office/drawing/2014/main" id="{D5129498-28A3-D649-B52F-8D571E7DC550}"/>
                 </a:ext>
               </a:extLst>
             </p:cNvPr>
@@ -13784,7 +15387,7 @@
             <p:cNvPr id="63" name="Oval 62">
               <a:extLst>
                 <a:ext uri="{FF2B5EF4-FFF2-40B4-BE49-F238E27FC236}">
-                  <a16:creationId xmlns:a16="http://schemas.microsoft.com/office/drawing/2014/main" id="{70A70BE7-7284-2142-B14C-E538299F3475}"/>
+                  <a16:creationId xmlns="" xmlns:a16="http://schemas.microsoft.com/office/drawing/2014/main" id="{70A70BE7-7284-2142-B14C-E538299F3475}"/>
                 </a:ext>
               </a:extLst>
             </p:cNvPr>
@@ -13830,7 +15433,7 @@
             <p:cNvPr id="64" name="Straight Connector 63">
               <a:extLst>
                 <a:ext uri="{FF2B5EF4-FFF2-40B4-BE49-F238E27FC236}">
-                  <a16:creationId xmlns:a16="http://schemas.microsoft.com/office/drawing/2014/main" id="{A6AC5435-4154-9247-86BE-33A7078000C7}"/>
+                  <a16:creationId xmlns="" xmlns:a16="http://schemas.microsoft.com/office/drawing/2014/main" id="{A6AC5435-4154-9247-86BE-33A7078000C7}"/>
                 </a:ext>
               </a:extLst>
             </p:cNvPr>
@@ -13870,7 +15473,7 @@
             <p:cNvPr id="65" name="Straight Connector 64">
               <a:extLst>
                 <a:ext uri="{FF2B5EF4-FFF2-40B4-BE49-F238E27FC236}">
-                  <a16:creationId xmlns:a16="http://schemas.microsoft.com/office/drawing/2014/main" id="{231C7164-9912-9E4F-A64F-01D94572A9EF}"/>
+                  <a16:creationId xmlns="" xmlns:a16="http://schemas.microsoft.com/office/drawing/2014/main" id="{231C7164-9912-9E4F-A64F-01D94572A9EF}"/>
                 </a:ext>
               </a:extLst>
             </p:cNvPr>
@@ -13909,7 +15512,7 @@
             <p:cNvPr id="66" name="Straight Connector 65">
               <a:extLst>
                 <a:ext uri="{FF2B5EF4-FFF2-40B4-BE49-F238E27FC236}">
-                  <a16:creationId xmlns:a16="http://schemas.microsoft.com/office/drawing/2014/main" id="{1A6B4F5F-7A36-8143-9249-47E02A5B4934}"/>
+                  <a16:creationId xmlns="" xmlns:a16="http://schemas.microsoft.com/office/drawing/2014/main" id="{1A6B4F5F-7A36-8143-9249-47E02A5B4934}"/>
                 </a:ext>
               </a:extLst>
             </p:cNvPr>
@@ -13949,7 +15552,7 @@
             <p:cNvPr id="67" name="Straight Connector 66">
               <a:extLst>
                 <a:ext uri="{FF2B5EF4-FFF2-40B4-BE49-F238E27FC236}">
-                  <a16:creationId xmlns:a16="http://schemas.microsoft.com/office/drawing/2014/main" id="{16051331-1194-A043-83BE-29C603BF44F4}"/>
+                  <a16:creationId xmlns="" xmlns:a16="http://schemas.microsoft.com/office/drawing/2014/main" id="{16051331-1194-A043-83BE-29C603BF44F4}"/>
                 </a:ext>
               </a:extLst>
             </p:cNvPr>
@@ -13988,7 +15591,7 @@
             <p:cNvPr id="68" name="Straight Connector 67">
               <a:extLst>
                 <a:ext uri="{FF2B5EF4-FFF2-40B4-BE49-F238E27FC236}">
-                  <a16:creationId xmlns:a16="http://schemas.microsoft.com/office/drawing/2014/main" id="{772F3E67-FAA9-A54E-8084-35529CE58F05}"/>
+                  <a16:creationId xmlns="" xmlns:a16="http://schemas.microsoft.com/office/drawing/2014/main" id="{772F3E67-FAA9-A54E-8084-35529CE58F05}"/>
                 </a:ext>
               </a:extLst>
             </p:cNvPr>
@@ -14027,7 +15630,7 @@
             <p:cNvPr id="69" name="Straight Connector 68">
               <a:extLst>
                 <a:ext uri="{FF2B5EF4-FFF2-40B4-BE49-F238E27FC236}">
-                  <a16:creationId xmlns:a16="http://schemas.microsoft.com/office/drawing/2014/main" id="{39E82FE7-2144-914E-B2ED-620F8FB1ECCC}"/>
+                  <a16:creationId xmlns="" xmlns:a16="http://schemas.microsoft.com/office/drawing/2014/main" id="{39E82FE7-2144-914E-B2ED-620F8FB1ECCC}"/>
                 </a:ext>
               </a:extLst>
             </p:cNvPr>

</xml_diff>